<commit_message>
feat: revisi buku - conf matrix - figure design
</commit_message>
<xml_diff>
--- a/Submit Sidang/05111942000001-Adam Satria Adidarma-Presentasi TA.pptx
+++ b/Submit Sidang/05111942000001-Adam Satria Adidarma-Presentasi TA.pptx
@@ -322,7 +322,7 @@
           <a:p>
             <a:fld id="{2D8DF117-F36D-4197-BD9C-D7ED3849AC71}" type="datetimeFigureOut">
               <a:rPr lang="en-US" smtClean="0"/>
-              <a:t>6/8/2023</a:t>
+              <a:t>6/12/2023</a:t>
             </a:fld>
             <a:endParaRPr lang="en-US"/>
           </a:p>
@@ -487,7 +487,7 @@
           <a:p>
             <a:fld id="{F2C69B06-AE52-4203-9155-65C4258A32D1}" type="datetimeFigureOut">
               <a:rPr lang="en-US" smtClean="0"/>
-              <a:t>6/8/2023</a:t>
+              <a:t>6/12/2023</a:t>
             </a:fld>
             <a:endParaRPr lang="en-US"/>
           </a:p>
@@ -2892,7 +2892,7 @@
           <a:p>
             <a:fld id="{82E1281C-38DA-4818-8C55-31099151AAF6}" type="datetimeFigureOut">
               <a:rPr lang="id-ID" smtClean="0"/>
-              <a:t>08/06/2023</a:t>
+              <a:t>12/06/2023</a:t>
             </a:fld>
             <a:endParaRPr lang="id-ID"/>
           </a:p>
@@ -3062,7 +3062,7 @@
           <a:p>
             <a:fld id="{82E1281C-38DA-4818-8C55-31099151AAF6}" type="datetimeFigureOut">
               <a:rPr lang="id-ID" smtClean="0"/>
-              <a:t>08/06/2023</a:t>
+              <a:t>12/06/2023</a:t>
             </a:fld>
             <a:endParaRPr lang="id-ID"/>
           </a:p>
@@ -3242,7 +3242,7 @@
           <a:p>
             <a:fld id="{82E1281C-38DA-4818-8C55-31099151AAF6}" type="datetimeFigureOut">
               <a:rPr lang="id-ID" smtClean="0"/>
-              <a:t>08/06/2023</a:t>
+              <a:t>12/06/2023</a:t>
             </a:fld>
             <a:endParaRPr lang="id-ID"/>
           </a:p>
@@ -4313,7 +4313,7 @@
                 </a:solidFill>
               </a:rPr>
               <a:pPr/>
-              <a:t>6/8/2023</a:t>
+              <a:t>6/12/2023</a:t>
             </a:fld>
             <a:endParaRPr lang="en-US">
               <a:solidFill>
@@ -4543,7 +4543,7 @@
                 </a:solidFill>
               </a:rPr>
               <a:pPr/>
-              <a:t>6/8/2023</a:t>
+              <a:t>6/12/2023</a:t>
             </a:fld>
             <a:endParaRPr lang="en-US">
               <a:solidFill>
@@ -4850,7 +4850,7 @@
                 </a:solidFill>
               </a:rPr>
               <a:pPr/>
-              <a:t>6/8/2023</a:t>
+              <a:t>6/12/2023</a:t>
             </a:fld>
             <a:endParaRPr lang="en-US">
               <a:solidFill>
@@ -5147,7 +5147,7 @@
                 </a:solidFill>
               </a:rPr>
               <a:pPr/>
-              <a:t>6/8/2023</a:t>
+              <a:t>6/12/2023</a:t>
             </a:fld>
             <a:endParaRPr lang="en-US">
               <a:solidFill>
@@ -5591,7 +5591,7 @@
                 </a:solidFill>
               </a:rPr>
               <a:pPr/>
-              <a:t>6/8/2023</a:t>
+              <a:t>6/12/2023</a:t>
             </a:fld>
             <a:endParaRPr lang="en-US">
               <a:solidFill>
@@ -5764,7 +5764,7 @@
                 </a:solidFill>
               </a:rPr>
               <a:pPr/>
-              <a:t>6/8/2023</a:t>
+              <a:t>6/12/2023</a:t>
             </a:fld>
             <a:endParaRPr lang="en-US">
               <a:solidFill>
@@ -5909,7 +5909,7 @@
                 </a:solidFill>
               </a:rPr>
               <a:pPr/>
-              <a:t>6/8/2023</a:t>
+              <a:t>6/12/2023</a:t>
             </a:fld>
             <a:endParaRPr lang="en-US">
               <a:solidFill>
@@ -6206,7 +6206,7 @@
           <a:p>
             <a:fld id="{82E1281C-38DA-4818-8C55-31099151AAF6}" type="datetimeFigureOut">
               <a:rPr lang="id-ID" smtClean="0"/>
-              <a:t>08/06/2023</a:t>
+              <a:t>12/06/2023</a:t>
             </a:fld>
             <a:endParaRPr lang="id-ID"/>
           </a:p>
@@ -6512,7 +6512,7 @@
                 </a:solidFill>
               </a:rPr>
               <a:pPr/>
-              <a:t>6/8/2023</a:t>
+              <a:t>6/12/2023</a:t>
             </a:fld>
             <a:endParaRPr lang="en-US">
               <a:solidFill>
@@ -6832,7 +6832,7 @@
                 </a:solidFill>
               </a:rPr>
               <a:pPr/>
-              <a:t>6/8/2023</a:t>
+              <a:t>6/12/2023</a:t>
             </a:fld>
             <a:endParaRPr lang="en-US">
               <a:solidFill>
@@ -7062,7 +7062,7 @@
                 </a:solidFill>
               </a:rPr>
               <a:pPr/>
-              <a:t>6/8/2023</a:t>
+              <a:t>6/12/2023</a:t>
             </a:fld>
             <a:endParaRPr lang="en-US">
               <a:solidFill>
@@ -7302,7 +7302,7 @@
                 </a:solidFill>
               </a:rPr>
               <a:pPr/>
-              <a:t>6/8/2023</a:t>
+              <a:t>6/12/2023</a:t>
             </a:fld>
             <a:endParaRPr lang="en-US">
               <a:solidFill>
@@ -7475,7 +7475,7 @@
                 </a:solidFill>
               </a:rPr>
               <a:pPr/>
-              <a:t>6/8/2023</a:t>
+              <a:t>6/12/2023</a:t>
             </a:fld>
             <a:endParaRPr lang="en-US">
               <a:solidFill>
@@ -7758,7 +7758,7 @@
           <a:p>
             <a:fld id="{82E1281C-38DA-4818-8C55-31099151AAF6}" type="datetimeFigureOut">
               <a:rPr lang="id-ID" smtClean="0"/>
-              <a:t>08/06/2023</a:t>
+              <a:t>12/06/2023</a:t>
             </a:fld>
             <a:endParaRPr lang="id-ID"/>
           </a:p>
@@ -7990,7 +7990,7 @@
           <a:p>
             <a:fld id="{82E1281C-38DA-4818-8C55-31099151AAF6}" type="datetimeFigureOut">
               <a:rPr lang="id-ID" smtClean="0"/>
-              <a:t>08/06/2023</a:t>
+              <a:t>12/06/2023</a:t>
             </a:fld>
             <a:endParaRPr lang="id-ID"/>
           </a:p>
@@ -8357,7 +8357,7 @@
           <a:p>
             <a:fld id="{82E1281C-38DA-4818-8C55-31099151AAF6}" type="datetimeFigureOut">
               <a:rPr lang="id-ID" smtClean="0"/>
-              <a:t>08/06/2023</a:t>
+              <a:t>12/06/2023</a:t>
             </a:fld>
             <a:endParaRPr lang="id-ID"/>
           </a:p>
@@ -8475,7 +8475,7 @@
           <a:p>
             <a:fld id="{82E1281C-38DA-4818-8C55-31099151AAF6}" type="datetimeFigureOut">
               <a:rPr lang="id-ID" smtClean="0"/>
-              <a:t>08/06/2023</a:t>
+              <a:t>12/06/2023</a:t>
             </a:fld>
             <a:endParaRPr lang="id-ID"/>
           </a:p>
@@ -8570,7 +8570,7 @@
           <a:p>
             <a:fld id="{82E1281C-38DA-4818-8C55-31099151AAF6}" type="datetimeFigureOut">
               <a:rPr lang="id-ID" smtClean="0"/>
-              <a:t>08/06/2023</a:t>
+              <a:t>12/06/2023</a:t>
             </a:fld>
             <a:endParaRPr lang="id-ID"/>
           </a:p>
@@ -8847,7 +8847,7 @@
           <a:p>
             <a:fld id="{82E1281C-38DA-4818-8C55-31099151AAF6}" type="datetimeFigureOut">
               <a:rPr lang="id-ID" smtClean="0"/>
-              <a:t>08/06/2023</a:t>
+              <a:t>12/06/2023</a:t>
             </a:fld>
             <a:endParaRPr lang="id-ID"/>
           </a:p>
@@ -9100,7 +9100,7 @@
           <a:p>
             <a:fld id="{82E1281C-38DA-4818-8C55-31099151AAF6}" type="datetimeFigureOut">
               <a:rPr lang="id-ID" smtClean="0"/>
-              <a:t>08/06/2023</a:t>
+              <a:t>12/06/2023</a:t>
             </a:fld>
             <a:endParaRPr lang="id-ID"/>
           </a:p>
@@ -9322,7 +9322,7 @@
           <a:p>
             <a:fld id="{82E1281C-38DA-4818-8C55-31099151AAF6}" type="datetimeFigureOut">
               <a:rPr lang="id-ID" smtClean="0"/>
-              <a:t>08/06/2023</a:t>
+              <a:t>12/06/2023</a:t>
             </a:fld>
             <a:endParaRPr lang="id-ID"/>
           </a:p>
@@ -9895,7 +9895,7 @@
                 </a:solidFill>
               </a:rPr>
               <a:pPr/>
-              <a:t>6/8/2023</a:t>
+              <a:t>6/12/2023</a:t>
             </a:fld>
             <a:endParaRPr lang="en-US">
               <a:solidFill>
@@ -14222,27 +14222,28 @@
       </p:sp>
       <p:pic>
         <p:nvPicPr>
-          <p:cNvPr id="5" name="Google Shape;392;g24a93ca963e_0_32">
+          <p:cNvPr id="6" name="Google Shape;393;g24a93ca963e_0_32">
             <a:extLst>
               <a:ext uri="{FF2B5EF4-FFF2-40B4-BE49-F238E27FC236}">
-                <a16:creationId xmlns:a16="http://schemas.microsoft.com/office/drawing/2014/main" id="{AE299FEB-4223-5B9E-8E3B-AB9F2310263D}"/>
+                <a16:creationId xmlns:a16="http://schemas.microsoft.com/office/drawing/2014/main" id="{F4341A39-B4E2-A859-5BD9-9FCF1F7B380E}"/>
               </a:ext>
             </a:extLst>
           </p:cNvPr>
           <p:cNvPicPr preferRelativeResize="0"/>
           <p:nvPr/>
         </p:nvPicPr>
-        <p:blipFill rotWithShape="1">
+        <p:blipFill>
           <a:blip r:embed="rId3">
             <a:alphaModFix/>
           </a:blip>
-          <a:srcRect l="50946"/>
-          <a:stretch/>
+          <a:stretch>
+            <a:fillRect/>
+          </a:stretch>
         </p:blipFill>
         <p:spPr>
           <a:xfrm>
-            <a:off x="335232" y="1448736"/>
-            <a:ext cx="5331772" cy="4320576"/>
+            <a:off x="6885046" y="2601006"/>
+            <a:ext cx="4140552" cy="2448955"/>
           </a:xfrm>
           <a:prstGeom prst="rect">
             <a:avLst/>
@@ -14255,19 +14256,25 @@
       </p:pic>
       <p:pic>
         <p:nvPicPr>
-          <p:cNvPr id="6" name="Google Shape;393;g24a93ca963e_0_32">
+          <p:cNvPr id="4" name="Picture 3" descr="A picture containing text, screenshot, square&#10;&#10;Description automatically generated">
             <a:extLst>
               <a:ext uri="{FF2B5EF4-FFF2-40B4-BE49-F238E27FC236}">
-                <a16:creationId xmlns:a16="http://schemas.microsoft.com/office/drawing/2014/main" id="{F4341A39-B4E2-A859-5BD9-9FCF1F7B380E}"/>
+                <a16:creationId xmlns:a16="http://schemas.microsoft.com/office/drawing/2014/main" id="{E6822C04-2655-9AB3-C754-BBDAEF414E4D}"/>
               </a:ext>
             </a:extLst>
           </p:cNvPr>
-          <p:cNvPicPr preferRelativeResize="0"/>
+          <p:cNvPicPr>
+            <a:picLocks noChangeAspect="1"/>
+          </p:cNvPicPr>
           <p:nvPr/>
         </p:nvPicPr>
         <p:blipFill>
           <a:blip r:embed="rId4">
-            <a:alphaModFix/>
+            <a:extLst>
+              <a:ext uri="{28A0092B-C50C-407E-A947-70E740481C1C}">
+                <a14:useLocalDpi xmlns:a14="http://schemas.microsoft.com/office/drawing/2010/main" val="0"/>
+              </a:ext>
+            </a:extLst>
           </a:blip>
           <a:stretch>
             <a:fillRect/>
@@ -14275,16 +14282,12 @@
         </p:blipFill>
         <p:spPr>
           <a:xfrm>
-            <a:off x="6524998" y="2515530"/>
-            <a:ext cx="4140552" cy="2448955"/>
+            <a:off x="965316" y="1534212"/>
+            <a:ext cx="5099995" cy="4325112"/>
           </a:xfrm>
           <a:prstGeom prst="rect">
             <a:avLst/>
           </a:prstGeom>
-          <a:noFill/>
-          <a:ln>
-            <a:noFill/>
-          </a:ln>
         </p:spPr>
       </p:pic>
     </p:spTree>
@@ -14361,7 +14364,7 @@
         </p:blipFill>
         <p:spPr>
           <a:xfrm>
-            <a:off x="6366036" y="2708904"/>
+            <a:off x="6764887" y="2792381"/>
             <a:ext cx="4461797" cy="2173678"/>
           </a:xfrm>
           <a:prstGeom prst="rect">
@@ -14375,35 +14378,38 @@
       </p:pic>
       <p:pic>
         <p:nvPicPr>
-          <p:cNvPr id="6" name="Google Shape;402;g24a93ca963e_0_51">
+          <p:cNvPr id="4" name="Picture 3" descr="A picture containing text, screenshot, square&#10;&#10;Description automatically generated">
             <a:extLst>
               <a:ext uri="{FF2B5EF4-FFF2-40B4-BE49-F238E27FC236}">
-                <a16:creationId xmlns:a16="http://schemas.microsoft.com/office/drawing/2014/main" id="{5C25C374-C21F-1E0C-EAC5-51E45385F23C}"/>
+                <a16:creationId xmlns:a16="http://schemas.microsoft.com/office/drawing/2014/main" id="{72226589-076B-5525-E52A-6484A784EA70}"/>
               </a:ext>
             </a:extLst>
           </p:cNvPr>
-          <p:cNvPicPr preferRelativeResize="0"/>
+          <p:cNvPicPr>
+            <a:picLocks noChangeAspect="1"/>
+          </p:cNvPicPr>
           <p:nvPr/>
         </p:nvPicPr>
-        <p:blipFill rotWithShape="1">
+        <p:blipFill>
           <a:blip r:embed="rId4">
-            <a:alphaModFix/>
+            <a:extLst>
+              <a:ext uri="{28A0092B-C50C-407E-A947-70E740481C1C}">
+                <a14:useLocalDpi xmlns:a14="http://schemas.microsoft.com/office/drawing/2010/main" val="0"/>
+              </a:ext>
+            </a:extLst>
           </a:blip>
-          <a:srcRect l="49279"/>
-          <a:stretch/>
+          <a:stretch>
+            <a:fillRect/>
+          </a:stretch>
         </p:blipFill>
         <p:spPr>
           <a:xfrm>
-            <a:off x="245220" y="1358724"/>
-            <a:ext cx="5326561" cy="4320576"/>
+            <a:off x="965316" y="1442201"/>
+            <a:ext cx="5102352" cy="4327111"/>
           </a:xfrm>
           <a:prstGeom prst="rect">
             <a:avLst/>
           </a:prstGeom>
-          <a:noFill/>
-          <a:ln>
-            <a:noFill/>
-          </a:ln>
         </p:spPr>
       </p:pic>
     </p:spTree>
@@ -14460,27 +14466,28 @@
       </p:sp>
       <p:pic>
         <p:nvPicPr>
-          <p:cNvPr id="5" name="Google Shape;410;g24a93ca963e_0_59">
+          <p:cNvPr id="6" name="Google Shape;411;g24a93ca963e_0_59">
             <a:extLst>
               <a:ext uri="{FF2B5EF4-FFF2-40B4-BE49-F238E27FC236}">
-                <a16:creationId xmlns:a16="http://schemas.microsoft.com/office/drawing/2014/main" id="{EFCA99D7-3BD3-CF29-25D2-6EC4960677A6}"/>
+                <a16:creationId xmlns:a16="http://schemas.microsoft.com/office/drawing/2014/main" id="{048018F0-894E-6295-02E7-C8BBA5375976}"/>
               </a:ext>
             </a:extLst>
           </p:cNvPr>
           <p:cNvPicPr preferRelativeResize="0"/>
           <p:nvPr/>
         </p:nvPicPr>
-        <p:blipFill rotWithShape="1">
+        <p:blipFill>
           <a:blip r:embed="rId3">
             <a:alphaModFix/>
           </a:blip>
-          <a:srcRect l="50946"/>
-          <a:stretch/>
+          <a:stretch>
+            <a:fillRect/>
+          </a:stretch>
         </p:blipFill>
         <p:spPr>
           <a:xfrm>
-            <a:off x="335232" y="1448736"/>
-            <a:ext cx="5326362" cy="4316190"/>
+            <a:off x="6996120" y="2514114"/>
+            <a:ext cx="4140552" cy="2468397"/>
           </a:xfrm>
           <a:prstGeom prst="rect">
             <a:avLst/>
@@ -14493,19 +14500,25 @@
       </p:pic>
       <p:pic>
         <p:nvPicPr>
-          <p:cNvPr id="6" name="Google Shape;411;g24a93ca963e_0_59">
+          <p:cNvPr id="4" name="Picture 3" descr="A screenshot of a graph&#10;&#10;Description automatically generated with low confidence">
             <a:extLst>
               <a:ext uri="{FF2B5EF4-FFF2-40B4-BE49-F238E27FC236}">
-                <a16:creationId xmlns:a16="http://schemas.microsoft.com/office/drawing/2014/main" id="{048018F0-894E-6295-02E7-C8BBA5375976}"/>
+                <a16:creationId xmlns:a16="http://schemas.microsoft.com/office/drawing/2014/main" id="{69AF028F-2561-063A-EB0E-A5E30D6322DA}"/>
               </a:ext>
             </a:extLst>
           </p:cNvPr>
-          <p:cNvPicPr preferRelativeResize="0"/>
+          <p:cNvPicPr>
+            <a:picLocks noChangeAspect="1"/>
+          </p:cNvPicPr>
           <p:nvPr/>
         </p:nvPicPr>
         <p:blipFill>
           <a:blip r:embed="rId4">
-            <a:alphaModFix/>
+            <a:extLst>
+              <a:ext uri="{28A0092B-C50C-407E-A947-70E740481C1C}">
+                <a14:useLocalDpi xmlns:a14="http://schemas.microsoft.com/office/drawing/2010/main" val="0"/>
+              </a:ext>
+            </a:extLst>
           </a:blip>
           <a:stretch>
             <a:fillRect/>
@@ -14513,16 +14526,12 @@
         </p:blipFill>
         <p:spPr>
           <a:xfrm>
-            <a:off x="6530408" y="2425176"/>
-            <a:ext cx="4140552" cy="2468397"/>
+            <a:off x="1070980" y="1532213"/>
+            <a:ext cx="5102352" cy="4327111"/>
           </a:xfrm>
           <a:prstGeom prst="rect">
             <a:avLst/>
           </a:prstGeom>
-          <a:noFill/>
-          <a:ln>
-            <a:noFill/>
-          </a:ln>
         </p:spPr>
       </p:pic>
     </p:spTree>
@@ -15210,19 +15219,25 @@
       </p:graphicFrame>
       <p:pic>
         <p:nvPicPr>
-          <p:cNvPr id="8" name="Google Shape;430;g24a93ca963e_0_44">
+          <p:cNvPr id="4" name="Picture 3" descr="A picture containing text, screenshot, diagram, plot&#10;&#10;Description automatically generated">
             <a:extLst>
               <a:ext uri="{FF2B5EF4-FFF2-40B4-BE49-F238E27FC236}">
-                <a16:creationId xmlns:a16="http://schemas.microsoft.com/office/drawing/2014/main" id="{4B0CBB41-5C4C-561B-D53D-427BF81CCCA0}"/>
+                <a16:creationId xmlns:a16="http://schemas.microsoft.com/office/drawing/2014/main" id="{3BDF7B30-7B07-E254-DD8E-93CAAB42DADF}"/>
               </a:ext>
             </a:extLst>
           </p:cNvPr>
-          <p:cNvPicPr preferRelativeResize="0"/>
+          <p:cNvPicPr>
+            <a:picLocks noChangeAspect="1"/>
+          </p:cNvPicPr>
           <p:nvPr/>
         </p:nvPicPr>
         <p:blipFill>
           <a:blip r:embed="rId3">
-            <a:alphaModFix/>
+            <a:extLst>
+              <a:ext uri="{28A0092B-C50C-407E-A947-70E740481C1C}">
+                <a14:useLocalDpi xmlns:a14="http://schemas.microsoft.com/office/drawing/2010/main" val="0"/>
+              </a:ext>
+            </a:extLst>
           </a:blip>
           <a:stretch>
             <a:fillRect/>
@@ -15230,16 +15245,12 @@
         </p:blipFill>
         <p:spPr>
           <a:xfrm>
-            <a:off x="6546060" y="2353837"/>
-            <a:ext cx="4442880" cy="2771951"/>
+            <a:off x="5932439" y="1988808"/>
+            <a:ext cx="5421361" cy="3383702"/>
           </a:xfrm>
           <a:prstGeom prst="rect">
             <a:avLst/>
           </a:prstGeom>
-          <a:noFill/>
-          <a:ln>
-            <a:noFill/>
-          </a:ln>
         </p:spPr>
       </p:pic>
     </p:spTree>
@@ -16053,7 +16064,7 @@
         </p:blipFill>
         <p:spPr bwMode="auto">
           <a:xfrm>
-            <a:off x="785292" y="3386014"/>
+            <a:off x="515256" y="3386014"/>
             <a:ext cx="2730905" cy="1844045"/>
           </a:xfrm>
           <a:prstGeom prst="rect">
@@ -16100,7 +16111,7 @@
         </p:blipFill>
         <p:spPr bwMode="auto">
           <a:xfrm>
-            <a:off x="7626204" y="2798916"/>
+            <a:off x="7356168" y="2798916"/>
             <a:ext cx="4228688" cy="2927084"/>
           </a:xfrm>
           <a:prstGeom prst="rect">
@@ -16132,7 +16143,7 @@
         </p:nvSpPr>
         <p:spPr>
           <a:xfrm>
-            <a:off x="1835978" y="3167362"/>
+            <a:off x="1565942" y="3167362"/>
             <a:ext cx="629531" cy="369332"/>
           </a:xfrm>
           <a:prstGeom prst="rect">
@@ -16167,7 +16178,7 @@
         </p:nvSpPr>
         <p:spPr>
           <a:xfrm>
-            <a:off x="8976384" y="2299127"/>
+            <a:off x="8706348" y="2299127"/>
             <a:ext cx="1990097" cy="369332"/>
           </a:xfrm>
           <a:prstGeom prst="rect">
@@ -16202,7 +16213,7 @@
         </p:nvSpPr>
         <p:spPr>
           <a:xfrm>
-            <a:off x="3379728" y="4234511"/>
+            <a:off x="3109692" y="4234511"/>
             <a:ext cx="315048" cy="147047"/>
           </a:xfrm>
           <a:prstGeom prst="rightArrow">
@@ -16252,7 +16263,7 @@
         </p:nvSpPr>
         <p:spPr>
           <a:xfrm>
-            <a:off x="7144332" y="4250646"/>
+            <a:off x="6874296" y="4250646"/>
             <a:ext cx="315048" cy="147047"/>
           </a:xfrm>
           <a:prstGeom prst="rightArrow">
@@ -16316,7 +16327,7 @@
         </p:blipFill>
         <p:spPr>
           <a:xfrm>
-            <a:off x="3935712" y="3158964"/>
+            <a:off x="3665676" y="3158964"/>
             <a:ext cx="3043200" cy="2282400"/>
           </a:xfrm>
           <a:prstGeom prst="rect">
@@ -16341,7 +16352,7 @@
         </p:nvSpPr>
         <p:spPr>
           <a:xfrm>
-            <a:off x="4986400" y="3167362"/>
+            <a:off x="4716364" y="3167362"/>
             <a:ext cx="1255472" cy="369332"/>
           </a:xfrm>
           <a:prstGeom prst="rect">
@@ -16552,12 +16563,50 @@
           </a:p>
         </p:txBody>
       </p:sp>
+      <p:sp>
+        <p:nvSpPr>
+          <p:cNvPr id="8" name="TextBox 7">
+            <a:extLst>
+              <a:ext uri="{FF2B5EF4-FFF2-40B4-BE49-F238E27FC236}">
+                <a16:creationId xmlns:a16="http://schemas.microsoft.com/office/drawing/2014/main" id="{255B2878-9A43-7CBC-22B0-F9042A82D76F}"/>
+              </a:ext>
+            </a:extLst>
+          </p:cNvPr>
+          <p:cNvSpPr txBox="1"/>
+          <p:nvPr/>
+        </p:nvSpPr>
+        <p:spPr>
+          <a:xfrm>
+            <a:off x="10056528" y="3519012"/>
+            <a:ext cx="716863" cy="246221"/>
+          </a:xfrm>
+          <a:prstGeom prst="rect">
+            <a:avLst/>
+          </a:prstGeom>
+          <a:noFill/>
+        </p:spPr>
+        <p:txBody>
+          <a:bodyPr wrap="square" rtlCol="0">
+            <a:spAutoFit/>
+          </a:bodyPr>
+          <a:lstStyle/>
+          <a:p>
+            <a:pPr algn="ctr"/>
+            <a:r>
+              <a:rPr lang="en-US" sz="1000" dirty="0">
+                <a:cs typeface="Times New Roman" panose="02020603050405020304" pitchFamily="18" charset="0"/>
+              </a:rPr>
+              <a:t>Emotion</a:t>
+            </a:r>
+          </a:p>
+        </p:txBody>
+      </p:sp>
       <p:pic>
         <p:nvPicPr>
-          <p:cNvPr id="5" name="Picture 4" descr="A picture containing text, screenshot, diagram, line&#10;&#10;Description automatically generated">
+          <p:cNvPr id="4" name="Picture 3" descr="A picture containing text, diagram, font, line&#10;&#10;Description automatically generated">
             <a:extLst>
               <a:ext uri="{FF2B5EF4-FFF2-40B4-BE49-F238E27FC236}">
-                <a16:creationId xmlns:a16="http://schemas.microsoft.com/office/drawing/2014/main" id="{BD311A59-6E4B-AB35-A55E-349D68D61A5B}"/>
+                <a16:creationId xmlns:a16="http://schemas.microsoft.com/office/drawing/2014/main" id="{2E38345A-9800-E727-7CD4-BBBC0D134015}"/>
               </a:ext>
             </a:extLst>
           </p:cNvPr>
@@ -16580,52 +16629,14 @@
         </p:blipFill>
         <p:spPr>
           <a:xfrm>
-            <a:off x="254572" y="2128001"/>
-            <a:ext cx="11682855" cy="3274464"/>
+            <a:off x="257828" y="2078820"/>
+            <a:ext cx="11679599" cy="3273552"/>
           </a:xfrm>
           <a:prstGeom prst="rect">
             <a:avLst/>
           </a:prstGeom>
         </p:spPr>
       </p:pic>
-      <p:sp>
-        <p:nvSpPr>
-          <p:cNvPr id="8" name="TextBox 7">
-            <a:extLst>
-              <a:ext uri="{FF2B5EF4-FFF2-40B4-BE49-F238E27FC236}">
-                <a16:creationId xmlns:a16="http://schemas.microsoft.com/office/drawing/2014/main" id="{255B2878-9A43-7CBC-22B0-F9042A82D76F}"/>
-              </a:ext>
-            </a:extLst>
-          </p:cNvPr>
-          <p:cNvSpPr txBox="1"/>
-          <p:nvPr/>
-        </p:nvSpPr>
-        <p:spPr>
-          <a:xfrm>
-            <a:off x="10056528" y="3519012"/>
-            <a:ext cx="716863" cy="246221"/>
-          </a:xfrm>
-          <a:prstGeom prst="rect">
-            <a:avLst/>
-          </a:prstGeom>
-          <a:noFill/>
-        </p:spPr>
-        <p:txBody>
-          <a:bodyPr wrap="square" rtlCol="0">
-            <a:spAutoFit/>
-          </a:bodyPr>
-          <a:lstStyle/>
-          <a:p>
-            <a:pPr algn="ctr"/>
-            <a:r>
-              <a:rPr lang="en-US" sz="1000" dirty="0">
-                <a:cs typeface="Times New Roman" panose="02020603050405020304" pitchFamily="18" charset="0"/>
-              </a:rPr>
-              <a:t>Emotion</a:t>
-            </a:r>
-          </a:p>
-        </p:txBody>
-      </p:sp>
     </p:spTree>
     <p:extLst>
       <p:ext uri="{BB962C8B-B14F-4D97-AF65-F5344CB8AC3E}">
@@ -24098,12 +24109,6 @@
 </file>
 
 <file path=customXml/item1.xml><?xml version="1.0" encoding="utf-8"?>
-<p:properties xmlns:p="http://schemas.microsoft.com/office/2006/metadata/properties" xmlns:xsi="http://www.w3.org/2001/XMLSchema-instance" xmlns:pc="http://schemas.microsoft.com/office/infopath/2007/PartnerControls">
-  <documentManagement/>
-</p:properties>
-</file>
-
-<file path=customXml/item2.xml><?xml version="1.0" encoding="utf-8"?>
 <ct:contentTypeSchema xmlns:ct="http://schemas.microsoft.com/office/2006/metadata/contentType" xmlns:ma="http://schemas.microsoft.com/office/2006/metadata/properties/metaAttributes" ct:_="" ma:_="" ma:contentTypeName="Dokumen" ma:contentTypeID="0x010100E578BFB713B0A04AA9CB3FB0E09BB096" ma:contentTypeVersion="8" ma:contentTypeDescription="Buat sebuah dokumen baru." ma:contentTypeScope="" ma:versionID="b12db5772b421c3d97e5e8cc52461df1">
   <xsd:schema xmlns:xsd="http://www.w3.org/2001/XMLSchema" xmlns:xs="http://www.w3.org/2001/XMLSchema" xmlns:p="http://schemas.microsoft.com/office/2006/metadata/properties" xmlns:ns3="d27b1e0a-a80f-43b3-a72c-03febd3edde5" targetNamespace="http://schemas.microsoft.com/office/2006/metadata/properties" ma:root="true" ma:fieldsID="93b8b61b0ccf34e75e41c3c949ba1e0b" ns3:_="">
     <xsd:import namespace="d27b1e0a-a80f-43b3-a72c-03febd3edde5"/>
@@ -24273,6 +24278,12 @@
 </ct:contentTypeSchema>
 </file>
 
+<file path=customXml/item2.xml><?xml version="1.0" encoding="utf-8"?>
+<p:properties xmlns:p="http://schemas.microsoft.com/office/2006/metadata/properties" xmlns:xsi="http://www.w3.org/2001/XMLSchema-instance" xmlns:pc="http://schemas.microsoft.com/office/infopath/2007/PartnerControls">
+  <documentManagement/>
+</p:properties>
+</file>
+
 <file path=customXml/item3.xml><?xml version="1.0" encoding="utf-8"?>
 <?mso-contentType ?>
 <FormTemplates xmlns="http://schemas.microsoft.com/sharepoint/v3/contenttype/forms">
@@ -24283,22 +24294,6 @@
 </file>
 
 <file path=customXml/itemProps1.xml><?xml version="1.0" encoding="utf-8"?>
-<ds:datastoreItem xmlns:ds="http://schemas.openxmlformats.org/officeDocument/2006/customXml" ds:itemID="{CD9CB790-CC05-41EE-8468-36831EC64B78}">
-  <ds:schemaRefs>
-    <ds:schemaRef ds:uri="http://schemas.openxmlformats.org/package/2006/metadata/core-properties"/>
-    <ds:schemaRef ds:uri="http://schemas.microsoft.com/office/2006/documentManagement/types"/>
-    <ds:schemaRef ds:uri="http://schemas.microsoft.com/office/infopath/2007/PartnerControls"/>
-    <ds:schemaRef ds:uri="d27b1e0a-a80f-43b3-a72c-03febd3edde5"/>
-    <ds:schemaRef ds:uri="http://schemas.microsoft.com/office/2006/metadata/properties"/>
-    <ds:schemaRef ds:uri="http://www.w3.org/XML/1998/namespace"/>
-    <ds:schemaRef ds:uri="http://purl.org/dc/dcmitype/"/>
-    <ds:schemaRef ds:uri="http://purl.org/dc/terms/"/>
-    <ds:schemaRef ds:uri="http://purl.org/dc/elements/1.1/"/>
-  </ds:schemaRefs>
-</ds:datastoreItem>
-</file>
-
-<file path=customXml/itemProps2.xml><?xml version="1.0" encoding="utf-8"?>
 <ds:datastoreItem xmlns:ds="http://schemas.openxmlformats.org/officeDocument/2006/customXml" ds:itemID="{74C6180C-AB73-4F26-8914-63FC793B0B03}">
   <ds:schemaRefs>
     <ds:schemaRef ds:uri="http://schemas.microsoft.com/office/2006/metadata/contentType"/>
@@ -24317,6 +24312,22 @@
 </ds:datastoreItem>
 </file>
 
+<file path=customXml/itemProps2.xml><?xml version="1.0" encoding="utf-8"?>
+<ds:datastoreItem xmlns:ds="http://schemas.openxmlformats.org/officeDocument/2006/customXml" ds:itemID="{CD9CB790-CC05-41EE-8468-36831EC64B78}">
+  <ds:schemaRefs>
+    <ds:schemaRef ds:uri="http://schemas.openxmlformats.org/package/2006/metadata/core-properties"/>
+    <ds:schemaRef ds:uri="http://schemas.microsoft.com/office/2006/documentManagement/types"/>
+    <ds:schemaRef ds:uri="http://schemas.microsoft.com/office/infopath/2007/PartnerControls"/>
+    <ds:schemaRef ds:uri="d27b1e0a-a80f-43b3-a72c-03febd3edde5"/>
+    <ds:schemaRef ds:uri="http://schemas.microsoft.com/office/2006/metadata/properties"/>
+    <ds:schemaRef ds:uri="http://www.w3.org/XML/1998/namespace"/>
+    <ds:schemaRef ds:uri="http://purl.org/dc/dcmitype/"/>
+    <ds:schemaRef ds:uri="http://purl.org/dc/terms/"/>
+    <ds:schemaRef ds:uri="http://purl.org/dc/elements/1.1/"/>
+  </ds:schemaRefs>
+</ds:datastoreItem>
+</file>
+
 <file path=customXml/itemProps3.xml><?xml version="1.0" encoding="utf-8"?>
 <ds:datastoreItem xmlns:ds="http://schemas.openxmlformats.org/officeDocument/2006/customXml" ds:itemID="{6F28412E-6216-429D-9368-A2DF44D347EE}">
   <ds:schemaRefs>

</xml_diff>

<commit_message>
feat: add demo recordings
</commit_message>
<xml_diff>
--- a/Submit Sidang/05111942000001-Adam Satria Adidarma-Presentasi TA.pptx
+++ b/Submit Sidang/05111942000001-Adam Satria Adidarma-Presentasi TA.pptx
@@ -322,7 +322,7 @@
           <a:p>
             <a:fld id="{2D8DF117-F36D-4197-BD9C-D7ED3849AC71}" type="datetimeFigureOut">
               <a:rPr lang="en-US" smtClean="0"/>
-              <a:t>6/16/23</a:t>
+              <a:t>6/19/2023</a:t>
             </a:fld>
             <a:endParaRPr lang="en-US"/>
           </a:p>
@@ -487,7 +487,7 @@
           <a:p>
             <a:fld id="{F2C69B06-AE52-4203-9155-65C4258A32D1}" type="datetimeFigureOut">
               <a:rPr lang="en-US" smtClean="0"/>
-              <a:t>6/16/23</a:t>
+              <a:t>6/19/2023</a:t>
             </a:fld>
             <a:endParaRPr lang="en-US"/>
           </a:p>
@@ -956,6 +956,9 @@
           <a:lstStyle/>
           <a:p>
             <a:pPr marL="457200" lvl="0" indent="-298450" algn="l" rtl="0">
+              <a:lnSpc>
+                <a:spcPct val="100000"/>
+              </a:lnSpc>
               <a:spcBef>
                 <a:spcPts val="0"/>
               </a:spcBef>
@@ -974,11 +977,14 @@
                   <a:schemeClr val="dk1"/>
                 </a:solidFill>
               </a:rPr>
-              <a:t>Column is model prediction, row is ground truth</a:t>
+              <a:t>Accuracy trend: Explain how the accuracy metric reflects the model's ability to correctly classify emotions in the audio data.</a:t>
             </a:r>
           </a:p>
           <a:p>
             <a:pPr marL="457200" lvl="0" indent="-298450" algn="l" rtl="0">
+              <a:lnSpc>
+                <a:spcPct val="100000"/>
+              </a:lnSpc>
               <a:spcBef>
                 <a:spcPts val="0"/>
               </a:spcBef>
@@ -997,11 +1003,14 @@
                   <a:schemeClr val="dk1"/>
                 </a:solidFill>
               </a:rPr>
-              <a:t>Focus on the off-diagonal elements and discuss the most common types of misclassifications</a:t>
+              <a:t>Loss trend: Explain that loss is a measure of how well the model is fitting the training data. A decreasing loss indicates that the model is learning and converging towards optimal performance.</a:t>
             </a:r>
           </a:p>
           <a:p>
             <a:pPr marL="457200" lvl="0" indent="-298450" algn="l" rtl="0">
+              <a:lnSpc>
+                <a:spcPct val="100000"/>
+              </a:lnSpc>
               <a:spcBef>
                 <a:spcPts val="0"/>
               </a:spcBef>
@@ -1020,11 +1029,14 @@
                   <a:schemeClr val="dk1"/>
                 </a:solidFill>
               </a:rPr>
-              <a:t>Discuss the emotions for which the model performs well and those for which it struggles</a:t>
+              <a:t>Convergence - Overfitting: Discuss the possibility of overfitting or underfitting based on the accuracy and loss curves. Overfitting occurs when the model performs well on the training data but fails to generalize to new data</a:t>
             </a:r>
           </a:p>
           <a:p>
             <a:pPr marL="457200" lvl="0" indent="-298450" algn="l" rtl="0">
+              <a:lnSpc>
+                <a:spcPct val="100000"/>
+              </a:lnSpc>
               <a:spcBef>
                 <a:spcPts val="0"/>
               </a:spcBef>
@@ -1043,7 +1055,7 @@
                   <a:schemeClr val="dk1"/>
                 </a:solidFill>
               </a:rPr>
-              <a:t>Discuss on the classification report</a:t>
+              <a:t>Fluctuation: If there are plateaus or fluctuations in the accuracy and loss graphs, explain the potential reasons behind them, Fluctuations may suggest that the model is struggling to converge.</a:t>
             </a:r>
           </a:p>
         </p:txBody>
@@ -1065,7 +1077,7 @@
           <a:p>
             <a:fld id="{E10FB84E-2805-4468-A00F-CFA6F38630CE}" type="slidenum">
               <a:rPr lang="en-US" smtClean="0"/>
-              <a:t>17</a:t>
+              <a:t>14</a:t>
             </a:fld>
             <a:endParaRPr lang="en-US"/>
           </a:p>
@@ -1074,7 +1086,7 @@
     </p:spTree>
     <p:extLst>
       <p:ext uri="{BB962C8B-B14F-4D97-AF65-F5344CB8AC3E}">
-        <p14:creationId xmlns:p14="http://schemas.microsoft.com/office/powerpoint/2010/main" val="2470340183"/>
+        <p14:creationId xmlns:p14="http://schemas.microsoft.com/office/powerpoint/2010/main" val="4223439829"/>
       </p:ext>
     </p:extLst>
   </p:cSld>
@@ -1238,7 +1250,7 @@
           <a:p>
             <a:fld id="{E10FB84E-2805-4468-A00F-CFA6F38630CE}" type="slidenum">
               <a:rPr lang="en-US" smtClean="0"/>
-              <a:t>18</a:t>
+              <a:t>16</a:t>
             </a:fld>
             <a:endParaRPr lang="en-US"/>
           </a:p>
@@ -1247,7 +1259,7 @@
     </p:spTree>
     <p:extLst>
       <p:ext uri="{BB962C8B-B14F-4D97-AF65-F5344CB8AC3E}">
-        <p14:creationId xmlns:p14="http://schemas.microsoft.com/office/powerpoint/2010/main" val="218149801"/>
+        <p14:creationId xmlns:p14="http://schemas.microsoft.com/office/powerpoint/2010/main" val="1658395778"/>
       </p:ext>
     </p:extLst>
   </p:cSld>
@@ -1301,7 +1313,96 @@
           <a:bodyPr/>
           <a:lstStyle/>
           <a:p>
-            <a:endParaRPr lang="en-US" dirty="0"/>
+            <a:pPr marL="457200" lvl="0" indent="-298450" algn="l" rtl="0">
+              <a:spcBef>
+                <a:spcPts val="0"/>
+              </a:spcBef>
+              <a:spcAft>
+                <a:spcPts val="0"/>
+              </a:spcAft>
+              <a:buClr>
+                <a:schemeClr val="dk1"/>
+              </a:buClr>
+              <a:buSzPts val="1100"/>
+              <a:buChar char="-"/>
+            </a:pPr>
+            <a:r>
+              <a:rPr lang="en-US" dirty="0">
+                <a:solidFill>
+                  <a:schemeClr val="dk1"/>
+                </a:solidFill>
+              </a:rPr>
+              <a:t>Column is model prediction, row is ground truth</a:t>
+            </a:r>
+          </a:p>
+          <a:p>
+            <a:pPr marL="457200" lvl="0" indent="-298450" algn="l" rtl="0">
+              <a:spcBef>
+                <a:spcPts val="0"/>
+              </a:spcBef>
+              <a:spcAft>
+                <a:spcPts val="0"/>
+              </a:spcAft>
+              <a:buClr>
+                <a:schemeClr val="dk1"/>
+              </a:buClr>
+              <a:buSzPts val="1100"/>
+              <a:buChar char="-"/>
+            </a:pPr>
+            <a:r>
+              <a:rPr lang="en-US" dirty="0">
+                <a:solidFill>
+                  <a:schemeClr val="dk1"/>
+                </a:solidFill>
+              </a:rPr>
+              <a:t>Focus on the off-diagonal elements and discuss the most common types of misclassifications</a:t>
+            </a:r>
+          </a:p>
+          <a:p>
+            <a:pPr marL="457200" lvl="0" indent="-298450" algn="l" rtl="0">
+              <a:spcBef>
+                <a:spcPts val="0"/>
+              </a:spcBef>
+              <a:spcAft>
+                <a:spcPts val="0"/>
+              </a:spcAft>
+              <a:buClr>
+                <a:schemeClr val="dk1"/>
+              </a:buClr>
+              <a:buSzPts val="1100"/>
+              <a:buChar char="-"/>
+            </a:pPr>
+            <a:r>
+              <a:rPr lang="en-US" dirty="0">
+                <a:solidFill>
+                  <a:schemeClr val="dk1"/>
+                </a:solidFill>
+              </a:rPr>
+              <a:t>Discuss the emotions for which the model performs well and those for which it struggles</a:t>
+            </a:r>
+          </a:p>
+          <a:p>
+            <a:pPr marL="457200" lvl="0" indent="-298450" algn="l" rtl="0">
+              <a:spcBef>
+                <a:spcPts val="0"/>
+              </a:spcBef>
+              <a:spcAft>
+                <a:spcPts val="0"/>
+              </a:spcAft>
+              <a:buClr>
+                <a:schemeClr val="dk1"/>
+              </a:buClr>
+              <a:buSzPts val="1100"/>
+              <a:buChar char="-"/>
+            </a:pPr>
+            <a:r>
+              <a:rPr lang="en-US" dirty="0">
+                <a:solidFill>
+                  <a:schemeClr val="dk1"/>
+                </a:solidFill>
+              </a:rPr>
+              <a:t>Discuss on the classification report</a:t>
+            </a:r>
           </a:p>
         </p:txBody>
       </p:sp>
@@ -1322,7 +1423,7 @@
           <a:p>
             <a:fld id="{E10FB84E-2805-4468-A00F-CFA6F38630CE}" type="slidenum">
               <a:rPr lang="en-US" smtClean="0"/>
-              <a:t>19</a:t>
+              <a:t>17</a:t>
             </a:fld>
             <a:endParaRPr lang="en-US"/>
           </a:p>
@@ -1331,7 +1432,7 @@
     </p:spTree>
     <p:extLst>
       <p:ext uri="{BB962C8B-B14F-4D97-AF65-F5344CB8AC3E}">
-        <p14:creationId xmlns:p14="http://schemas.microsoft.com/office/powerpoint/2010/main" val="3040658094"/>
+        <p14:creationId xmlns:p14="http://schemas.microsoft.com/office/powerpoint/2010/main" val="2470340183"/>
       </p:ext>
     </p:extLst>
   </p:cSld>
@@ -1385,6 +1486,263 @@
           <a:bodyPr/>
           <a:lstStyle/>
           <a:p>
+            <a:pPr marL="457200" lvl="0" indent="-298450" algn="l" rtl="0">
+              <a:spcBef>
+                <a:spcPts val="0"/>
+              </a:spcBef>
+              <a:spcAft>
+                <a:spcPts val="0"/>
+              </a:spcAft>
+              <a:buClr>
+                <a:schemeClr val="dk1"/>
+              </a:buClr>
+              <a:buSzPts val="1100"/>
+              <a:buChar char="-"/>
+            </a:pPr>
+            <a:r>
+              <a:rPr lang="en-US" dirty="0">
+                <a:solidFill>
+                  <a:schemeClr val="dk1"/>
+                </a:solidFill>
+              </a:rPr>
+              <a:t>Column is model prediction, row is ground truth</a:t>
+            </a:r>
+          </a:p>
+          <a:p>
+            <a:pPr marL="457200" lvl="0" indent="-298450" algn="l" rtl="0">
+              <a:spcBef>
+                <a:spcPts val="0"/>
+              </a:spcBef>
+              <a:spcAft>
+                <a:spcPts val="0"/>
+              </a:spcAft>
+              <a:buClr>
+                <a:schemeClr val="dk1"/>
+              </a:buClr>
+              <a:buSzPts val="1100"/>
+              <a:buChar char="-"/>
+            </a:pPr>
+            <a:r>
+              <a:rPr lang="en-US" dirty="0">
+                <a:solidFill>
+                  <a:schemeClr val="dk1"/>
+                </a:solidFill>
+              </a:rPr>
+              <a:t>Focus on the off-diagonal elements and discuss the most common types of misclassifications</a:t>
+            </a:r>
+          </a:p>
+          <a:p>
+            <a:pPr marL="457200" lvl="0" indent="-298450" algn="l" rtl="0">
+              <a:spcBef>
+                <a:spcPts val="0"/>
+              </a:spcBef>
+              <a:spcAft>
+                <a:spcPts val="0"/>
+              </a:spcAft>
+              <a:buClr>
+                <a:schemeClr val="dk1"/>
+              </a:buClr>
+              <a:buSzPts val="1100"/>
+              <a:buChar char="-"/>
+            </a:pPr>
+            <a:r>
+              <a:rPr lang="en-US" dirty="0">
+                <a:solidFill>
+                  <a:schemeClr val="dk1"/>
+                </a:solidFill>
+              </a:rPr>
+              <a:t>Discuss the emotions for which the model performs well and those for which it struggles</a:t>
+            </a:r>
+          </a:p>
+          <a:p>
+            <a:pPr marL="457200" lvl="0" indent="-298450" algn="l" rtl="0">
+              <a:spcBef>
+                <a:spcPts val="0"/>
+              </a:spcBef>
+              <a:spcAft>
+                <a:spcPts val="0"/>
+              </a:spcAft>
+              <a:buClr>
+                <a:schemeClr val="dk1"/>
+              </a:buClr>
+              <a:buSzPts val="1100"/>
+              <a:buChar char="-"/>
+            </a:pPr>
+            <a:r>
+              <a:rPr lang="en-US" dirty="0">
+                <a:solidFill>
+                  <a:schemeClr val="dk1"/>
+                </a:solidFill>
+              </a:rPr>
+              <a:t>Discuss on the classification report</a:t>
+            </a:r>
+          </a:p>
+        </p:txBody>
+      </p:sp>
+      <p:sp>
+        <p:nvSpPr>
+          <p:cNvPr id="4" name="Slide Number Placeholder 3"/>
+          <p:cNvSpPr>
+            <a:spLocks noGrp="1"/>
+          </p:cNvSpPr>
+          <p:nvPr>
+            <p:ph type="sldNum" sz="quarter" idx="5"/>
+          </p:nvPr>
+        </p:nvSpPr>
+        <p:spPr/>
+        <p:txBody>
+          <a:bodyPr/>
+          <a:lstStyle/>
+          <a:p>
+            <a:fld id="{E10FB84E-2805-4468-A00F-CFA6F38630CE}" type="slidenum">
+              <a:rPr lang="en-US" smtClean="0"/>
+              <a:t>18</a:t>
+            </a:fld>
+            <a:endParaRPr lang="en-US"/>
+          </a:p>
+        </p:txBody>
+      </p:sp>
+    </p:spTree>
+    <p:extLst>
+      <p:ext uri="{BB962C8B-B14F-4D97-AF65-F5344CB8AC3E}">
+        <p14:creationId xmlns:p14="http://schemas.microsoft.com/office/powerpoint/2010/main" val="218149801"/>
+      </p:ext>
+    </p:extLst>
+  </p:cSld>
+  <p:clrMapOvr>
+    <a:masterClrMapping/>
+  </p:clrMapOvr>
+</p:notes>
+</file>
+
+<file path=ppt/notesSlides/notesSlide14.xml><?xml version="1.0" encoding="utf-8"?>
+<p:notes xmlns:a="http://schemas.openxmlformats.org/drawingml/2006/main" xmlns:r="http://schemas.openxmlformats.org/officeDocument/2006/relationships" xmlns:p="http://schemas.openxmlformats.org/presentationml/2006/main">
+  <p:cSld>
+    <p:spTree>
+      <p:nvGrpSpPr>
+        <p:cNvPr id="1" name=""/>
+        <p:cNvGrpSpPr/>
+        <p:nvPr/>
+      </p:nvGrpSpPr>
+      <p:grpSpPr>
+        <a:xfrm>
+          <a:off x="0" y="0"/>
+          <a:ext cx="0" cy="0"/>
+          <a:chOff x="0" y="0"/>
+          <a:chExt cx="0" cy="0"/>
+        </a:xfrm>
+      </p:grpSpPr>
+      <p:sp>
+        <p:nvSpPr>
+          <p:cNvPr id="2" name="Slide Image Placeholder 1"/>
+          <p:cNvSpPr>
+            <a:spLocks noGrp="1" noRot="1" noChangeAspect="1"/>
+          </p:cNvSpPr>
+          <p:nvPr>
+            <p:ph type="sldImg"/>
+          </p:nvPr>
+        </p:nvSpPr>
+        <p:spPr/>
+      </p:sp>
+      <p:sp>
+        <p:nvSpPr>
+          <p:cNvPr id="3" name="Notes Placeholder 2"/>
+          <p:cNvSpPr>
+            <a:spLocks noGrp="1"/>
+          </p:cNvSpPr>
+          <p:nvPr>
+            <p:ph type="body" idx="1"/>
+          </p:nvPr>
+        </p:nvSpPr>
+        <p:spPr/>
+        <p:txBody>
+          <a:bodyPr/>
+          <a:lstStyle/>
+          <a:p>
+            <a:endParaRPr lang="en-US" dirty="0"/>
+          </a:p>
+        </p:txBody>
+      </p:sp>
+      <p:sp>
+        <p:nvSpPr>
+          <p:cNvPr id="4" name="Slide Number Placeholder 3"/>
+          <p:cNvSpPr>
+            <a:spLocks noGrp="1"/>
+          </p:cNvSpPr>
+          <p:nvPr>
+            <p:ph type="sldNum" sz="quarter" idx="5"/>
+          </p:nvPr>
+        </p:nvSpPr>
+        <p:spPr/>
+        <p:txBody>
+          <a:bodyPr/>
+          <a:lstStyle/>
+          <a:p>
+            <a:fld id="{E10FB84E-2805-4468-A00F-CFA6F38630CE}" type="slidenum">
+              <a:rPr lang="en-US" smtClean="0"/>
+              <a:t>19</a:t>
+            </a:fld>
+            <a:endParaRPr lang="en-US"/>
+          </a:p>
+        </p:txBody>
+      </p:sp>
+    </p:spTree>
+    <p:extLst>
+      <p:ext uri="{BB962C8B-B14F-4D97-AF65-F5344CB8AC3E}">
+        <p14:creationId xmlns:p14="http://schemas.microsoft.com/office/powerpoint/2010/main" val="3040658094"/>
+      </p:ext>
+    </p:extLst>
+  </p:cSld>
+  <p:clrMapOvr>
+    <a:masterClrMapping/>
+  </p:clrMapOvr>
+</p:notes>
+</file>
+
+<file path=ppt/notesSlides/notesSlide15.xml><?xml version="1.0" encoding="utf-8"?>
+<p:notes xmlns:a="http://schemas.openxmlformats.org/drawingml/2006/main" xmlns:r="http://schemas.openxmlformats.org/officeDocument/2006/relationships" xmlns:p="http://schemas.openxmlformats.org/presentationml/2006/main">
+  <p:cSld>
+    <p:spTree>
+      <p:nvGrpSpPr>
+        <p:cNvPr id="1" name=""/>
+        <p:cNvGrpSpPr/>
+        <p:nvPr/>
+      </p:nvGrpSpPr>
+      <p:grpSpPr>
+        <a:xfrm>
+          <a:off x="0" y="0"/>
+          <a:ext cx="0" cy="0"/>
+          <a:chOff x="0" y="0"/>
+          <a:chExt cx="0" cy="0"/>
+        </a:xfrm>
+      </p:grpSpPr>
+      <p:sp>
+        <p:nvSpPr>
+          <p:cNvPr id="2" name="Slide Image Placeholder 1"/>
+          <p:cNvSpPr>
+            <a:spLocks noGrp="1" noRot="1" noChangeAspect="1"/>
+          </p:cNvSpPr>
+          <p:nvPr>
+            <p:ph type="sldImg"/>
+          </p:nvPr>
+        </p:nvSpPr>
+        <p:spPr/>
+      </p:sp>
+      <p:sp>
+        <p:nvSpPr>
+          <p:cNvPr id="3" name="Notes Placeholder 2"/>
+          <p:cNvSpPr>
+            <a:spLocks noGrp="1"/>
+          </p:cNvSpPr>
+          <p:nvPr>
+            <p:ph type="body" idx="1"/>
+          </p:nvPr>
+        </p:nvSpPr>
+        <p:spPr/>
+        <p:txBody>
+          <a:bodyPr/>
+          <a:lstStyle/>
+          <a:p>
             <a:pPr marL="0" marR="0" lvl="0" indent="0" algn="l" defTabSz="914400" rtl="0" eaLnBrk="1" fontAlgn="auto" latinLnBrk="0" hangingPunct="1">
               <a:lnSpc>
                 <a:spcPct val="100000"/>
@@ -1456,7 +1814,7 @@
 </p:notes>
 </file>
 
-<file path=ppt/notesSlides/notesSlide14.xml><?xml version="1.0" encoding="utf-8"?>
+<file path=ppt/notesSlides/notesSlide16.xml><?xml version="1.0" encoding="utf-8"?>
 <p:notes xmlns:a="http://schemas.openxmlformats.org/drawingml/2006/main" xmlns:r="http://schemas.openxmlformats.org/officeDocument/2006/relationships" xmlns:p="http://schemas.openxmlformats.org/presentationml/2006/main">
   <p:cSld>
     <p:spTree>
@@ -1863,45 +2221,20 @@
           <a:bodyPr/>
           <a:lstStyle/>
           <a:p>
-            <a:pPr marL="0" marR="0" lvl="0" indent="0" algn="l" defTabSz="914400" rtl="0" eaLnBrk="1" fontAlgn="auto" latinLnBrk="0" hangingPunct="1">
-              <a:lnSpc>
-                <a:spcPct val="100000"/>
-              </a:lnSpc>
-              <a:spcBef>
-                <a:spcPts val="0"/>
-              </a:spcBef>
-              <a:spcAft>
-                <a:spcPts val="0"/>
-              </a:spcAft>
-              <a:buClrTx/>
-              <a:buSzTx/>
-              <a:buFontTx/>
-              <a:buNone/>
-              <a:tabLst/>
-              <a:defRPr/>
-            </a:pPr>
             <a:r>
               <a:rPr lang="en-US" dirty="0"/>
-              <a:t>A combination of Transformer Encoder consisting of self-attention layers, followed by a feedforward layer that consisted of two linear transformations with a </a:t>
-            </a:r>
-            <a:r>
-              <a:rPr lang="en-US" dirty="0" err="1"/>
-              <a:t>ReLU</a:t>
-            </a:r>
-            <a:r>
-              <a:rPr lang="en-US" dirty="0"/>
-              <a:t> activation in between and CNN-based architecture with a 3x3 convolution layer followed by an ELU activation function, batch normalization, pooling layers, and dropout regulation. These blocks are combined with a dense layer, and the resulting output is passed to a </a:t>
-            </a:r>
-            <a:r>
-              <a:rPr lang="en-US" dirty="0" err="1"/>
-              <a:t>softmax</a:t>
-            </a:r>
-            <a:r>
-              <a:rPr lang="en-US" dirty="0"/>
-              <a:t> activation function to convert prediction scores into a probability distribution of target class. </a:t>
-            </a:r>
-          </a:p>
-          <a:p>
+              <a:t>The idea is for the CNN block to give a feature representation on the audio data, while the transformer encoder block </a:t>
+            </a:r>
+            <a:r>
+              <a:rPr lang="en-US" b="0" i="0" dirty="0">
+                <a:solidFill>
+                  <a:srgbClr val="D1D5DB"/>
+                </a:solidFill>
+                <a:effectLst/>
+                <a:latin typeface="Söhne"/>
+              </a:rPr>
+              <a:t>learns to predict frequency distributions of different emotions by considering the overall structure of the MFCC plot for each emotion</a:t>
+            </a:r>
             <a:endParaRPr lang="en-US" dirty="0"/>
           </a:p>
         </p:txBody>
@@ -1923,7 +2256,7 @@
           <a:p>
             <a:fld id="{E10FB84E-2805-4468-A00F-CFA6F38630CE}" type="slidenum">
               <a:rPr lang="en-US" smtClean="0"/>
-              <a:t>7</a:t>
+              <a:t>6</a:t>
             </a:fld>
             <a:endParaRPr lang="en-US"/>
           </a:p>
@@ -1932,7 +2265,7 @@
     </p:spTree>
     <p:extLst>
       <p:ext uri="{BB962C8B-B14F-4D97-AF65-F5344CB8AC3E}">
-        <p14:creationId xmlns:p14="http://schemas.microsoft.com/office/powerpoint/2010/main" val="1277506641"/>
+        <p14:creationId xmlns:p14="http://schemas.microsoft.com/office/powerpoint/2010/main" val="226225810"/>
       </p:ext>
     </p:extLst>
   </p:cSld>
@@ -1986,6 +2319,45 @@
           <a:bodyPr/>
           <a:lstStyle/>
           <a:p>
+            <a:pPr marL="0" marR="0" lvl="0" indent="0" algn="l" defTabSz="914400" rtl="0" eaLnBrk="1" fontAlgn="auto" latinLnBrk="0" hangingPunct="1">
+              <a:lnSpc>
+                <a:spcPct val="100000"/>
+              </a:lnSpc>
+              <a:spcBef>
+                <a:spcPts val="0"/>
+              </a:spcBef>
+              <a:spcAft>
+                <a:spcPts val="0"/>
+              </a:spcAft>
+              <a:buClrTx/>
+              <a:buSzTx/>
+              <a:buFontTx/>
+              <a:buNone/>
+              <a:tabLst/>
+              <a:defRPr/>
+            </a:pPr>
+            <a:r>
+              <a:rPr lang="en-US" dirty="0"/>
+              <a:t>A combination of Transformer Encoder consisting of self-attention layers, followed by a feedforward layer that consisted of two linear transformations with a </a:t>
+            </a:r>
+            <a:r>
+              <a:rPr lang="en-US" dirty="0" err="1"/>
+              <a:t>ReLU</a:t>
+            </a:r>
+            <a:r>
+              <a:rPr lang="en-US" dirty="0"/>
+              <a:t> activation in between and CNN-based architecture with a 3x3 convolution layer followed by an ELU activation function, batch normalization, pooling layers, and dropout regulation. These blocks are combined with a dense layer, and the resulting output is passed to a </a:t>
+            </a:r>
+            <a:r>
+              <a:rPr lang="en-US" dirty="0" err="1"/>
+              <a:t>softmax</a:t>
+            </a:r>
+            <a:r>
+              <a:rPr lang="en-US" dirty="0"/>
+              <a:t> activation function to convert prediction scores into a probability distribution of target class. </a:t>
+            </a:r>
+          </a:p>
+          <a:p>
             <a:endParaRPr lang="en-US" dirty="0"/>
           </a:p>
         </p:txBody>
@@ -2007,7 +2379,7 @@
           <a:p>
             <a:fld id="{E10FB84E-2805-4468-A00F-CFA6F38630CE}" type="slidenum">
               <a:rPr lang="en-US" smtClean="0"/>
-              <a:t>8</a:t>
+              <a:t>7</a:t>
             </a:fld>
             <a:endParaRPr lang="en-US"/>
           </a:p>
@@ -2016,7 +2388,7 @@
     </p:spTree>
     <p:extLst>
       <p:ext uri="{BB962C8B-B14F-4D97-AF65-F5344CB8AC3E}">
-        <p14:creationId xmlns:p14="http://schemas.microsoft.com/office/powerpoint/2010/main" val="2175454381"/>
+        <p14:creationId xmlns:p14="http://schemas.microsoft.com/office/powerpoint/2010/main" val="1277506641"/>
       </p:ext>
     </p:extLst>
   </p:cSld>
@@ -2070,27 +2442,90 @@
           <a:bodyPr/>
           <a:lstStyle/>
           <a:p>
-            <a:pPr marL="0" marR="0" lvl="0" indent="0" algn="l" defTabSz="914400" rtl="0" eaLnBrk="1" fontAlgn="auto" latinLnBrk="0" hangingPunct="1">
-              <a:lnSpc>
-                <a:spcPct val="100000"/>
-              </a:lnSpc>
-              <a:spcBef>
-                <a:spcPts val="0"/>
-              </a:spcBef>
-              <a:spcAft>
-                <a:spcPts val="0"/>
-              </a:spcAft>
-              <a:buClrTx/>
-              <a:buSzTx/>
+            <a:pPr marL="171450" indent="-171450">
               <a:buFontTx/>
-              <a:buNone/>
-              <a:tabLst/>
-              <a:defRPr/>
+              <a:buChar char="-"/>
             </a:pPr>
             <a:r>
               <a:rPr lang="en-US" dirty="0"/>
-              <a:t>Conf Matrix: provides insights into the model's ability to correctly classify different classes and helps assess its performance in terms of precision, recall, and F1 score.</a:t>
-            </a:r>
+              <a:t>In the context of audio emotion recognition, this involves </a:t>
+            </a:r>
+            <a:r>
+              <a:rPr lang="en-US" sz="1800" b="0" i="0" u="none" strike="noStrike" baseline="0" dirty="0">
+                <a:solidFill>
+                  <a:srgbClr val="000000"/>
+                </a:solidFill>
+                <a:latin typeface="AAAAAB+TimesNewRomanPSMT"/>
+              </a:rPr>
+              <a:t>a series of steps, including </a:t>
+            </a:r>
+            <a:r>
+              <a:rPr lang="en-US" sz="1800" b="0" i="0" u="none" strike="noStrike" baseline="0" dirty="0" err="1">
+                <a:solidFill>
+                  <a:srgbClr val="000000"/>
+                </a:solidFill>
+                <a:latin typeface="AAAAAB+TimesNewRomanPSMT"/>
+              </a:rPr>
+              <a:t>downsampling</a:t>
+            </a:r>
+            <a:r>
+              <a:rPr lang="en-US" sz="1800" b="0" i="0" u="none" strike="noStrike" baseline="0" dirty="0">
+                <a:solidFill>
+                  <a:srgbClr val="000000"/>
+                </a:solidFill>
+                <a:latin typeface="AAAAAB+TimesNewRomanPSMT"/>
+              </a:rPr>
+              <a:t> the audio to a custom target sample rate, truncating the audio to a set number of duration, and removing any silence before the actors start talking. These steps help to ensure consistency in the audio data and remove any irrelevant noise or silence that may affect the accuracy of the emotion recognition model.</a:t>
+            </a:r>
+          </a:p>
+          <a:p>
+            <a:pPr marL="171450" indent="-171450">
+              <a:buFontTx/>
+              <a:buChar char="-"/>
+            </a:pPr>
+            <a:r>
+              <a:rPr lang="en-US" sz="1800" b="0" i="0" u="none" strike="noStrike" baseline="0" dirty="0">
+                <a:solidFill>
+                  <a:srgbClr val="000000"/>
+                </a:solidFill>
+                <a:latin typeface="AAAAAB+TimesNewRomanPSMT"/>
+              </a:rPr>
+              <a:t>MFCC are derived from a Mel-scale, which is a non-linear scale based on the perceived </a:t>
+            </a:r>
+            <a:r>
+              <a:rPr lang="en-US" sz="1800" b="0" i="0" u="none" strike="noStrike" baseline="0" dirty="0" err="1">
+                <a:solidFill>
+                  <a:srgbClr val="000000"/>
+                </a:solidFill>
+                <a:latin typeface="AAAAAB+TimesNewRomanPSMT"/>
+              </a:rPr>
+              <a:t>freq</a:t>
+            </a:r>
+            <a:r>
+              <a:rPr lang="en-US" sz="1800" b="0" i="0" u="none" strike="noStrike" baseline="0" dirty="0">
+                <a:solidFill>
+                  <a:srgbClr val="000000"/>
+                </a:solidFill>
+                <a:latin typeface="AAAAAB+TimesNewRomanPSMT"/>
+              </a:rPr>
+              <a:t> of a sound by the human ear.</a:t>
+            </a:r>
+          </a:p>
+          <a:p>
+            <a:pPr marL="171450" indent="-171450">
+              <a:buFontTx/>
+              <a:buChar char="-"/>
+            </a:pPr>
+            <a:r>
+              <a:rPr lang="en-US" sz="1800" b="0" i="0" u="none" strike="noStrike" baseline="0" dirty="0">
+                <a:solidFill>
+                  <a:srgbClr val="000000"/>
+                </a:solidFill>
+                <a:latin typeface="AAAAAB+TimesNewRomanPSMT"/>
+              </a:rPr>
+              <a:t>After the audio features have been extracted, the next step is to create the model architecture and use the extracted features as input to the model which will allow the model to classify human emotions based on the extracted features.</a:t>
+            </a:r>
+            <a:endParaRPr lang="en-US" dirty="0"/>
           </a:p>
         </p:txBody>
       </p:sp>
@@ -2111,7 +2546,7 @@
           <a:p>
             <a:fld id="{E10FB84E-2805-4468-A00F-CFA6F38630CE}" type="slidenum">
               <a:rPr lang="en-US" smtClean="0"/>
-              <a:t>10</a:t>
+              <a:t>8</a:t>
             </a:fld>
             <a:endParaRPr lang="en-US"/>
           </a:p>
@@ -2120,7 +2555,7 @@
     </p:spTree>
     <p:extLst>
       <p:ext uri="{BB962C8B-B14F-4D97-AF65-F5344CB8AC3E}">
-        <p14:creationId xmlns:p14="http://schemas.microsoft.com/office/powerpoint/2010/main" val="156311942"/>
+        <p14:creationId xmlns:p14="http://schemas.microsoft.com/office/powerpoint/2010/main" val="2175454381"/>
       </p:ext>
     </p:extLst>
   </p:cSld>
@@ -2174,110 +2609,66 @@
           <a:bodyPr/>
           <a:lstStyle/>
           <a:p>
-            <a:pPr marL="457200" lvl="0" indent="-298450" algn="l" rtl="0">
-              <a:lnSpc>
-                <a:spcPct val="100000"/>
-              </a:lnSpc>
-              <a:spcBef>
-                <a:spcPts val="0"/>
-              </a:spcBef>
-              <a:spcAft>
-                <a:spcPts val="0"/>
-              </a:spcAft>
-              <a:buClr>
-                <a:schemeClr val="dk1"/>
-              </a:buClr>
-              <a:buSzPts val="1100"/>
+            <a:pPr marL="171450" indent="-171450">
+              <a:buFontTx/>
               <a:buChar char="-"/>
             </a:pPr>
             <a:r>
-              <a:rPr lang="en-US" dirty="0">
-                <a:solidFill>
-                  <a:schemeClr val="dk1"/>
-                </a:solidFill>
-              </a:rPr>
-              <a:t>Accuracy trend: Explain how the accuracy metric reflects the model's ability to correctly classify emotions in the audio data.</a:t>
-            </a:r>
-          </a:p>
-          <a:p>
-            <a:pPr marL="457200" lvl="0" indent="-298450" algn="l" rtl="0">
-              <a:lnSpc>
-                <a:spcPct val="100000"/>
-              </a:lnSpc>
-              <a:spcBef>
-                <a:spcPts val="0"/>
-              </a:spcBef>
-              <a:spcAft>
-                <a:spcPts val="0"/>
-              </a:spcAft>
-              <a:buClr>
-                <a:schemeClr val="dk1"/>
-              </a:buClr>
-              <a:buSzPts val="1100"/>
+              <a:rPr lang="en-US" dirty="0"/>
+              <a:t>Two types of audio data records, lab recording &amp; non-lab recording.</a:t>
+            </a:r>
+          </a:p>
+          <a:p>
+            <a:pPr marL="171450" indent="-171450">
+              <a:buFontTx/>
               <a:buChar char="-"/>
             </a:pPr>
             <a:r>
-              <a:rPr lang="en-US" dirty="0">
-                <a:solidFill>
-                  <a:schemeClr val="dk1"/>
-                </a:solidFill>
+              <a:rPr lang="en-US" dirty="0"/>
+              <a:t>Lab recording: </a:t>
+            </a:r>
+            <a:r>
+              <a:rPr lang="en-US" sz="1800" b="0" i="0" u="none" strike="noStrike" baseline="0" dirty="0">
+                <a:solidFill>
+                  <a:srgbClr val="000000"/>
+                </a:solidFill>
+                <a:latin typeface="AAAAAB+TimesNewRomanPSMT"/>
               </a:rPr>
-              <a:t>Loss trend: Explain that loss is a measure of how well the model is fitting the training data. A decreasing loss indicates that the model is learning and converging towards optimal performance.</a:t>
-            </a:r>
-          </a:p>
-          <a:p>
-            <a:pPr marL="457200" lvl="0" indent="-298450" algn="l" rtl="0">
-              <a:lnSpc>
-                <a:spcPct val="100000"/>
-              </a:lnSpc>
-              <a:spcBef>
-                <a:spcPts val="0"/>
-              </a:spcBef>
-              <a:spcAft>
-                <a:spcPts val="0"/>
-              </a:spcAft>
-              <a:buClr>
-                <a:schemeClr val="dk1"/>
-              </a:buClr>
-              <a:buSzPts val="1100"/>
+              <a:t>recorded in a recording studio using high-quality microphones and accompanied by linguistics experts.</a:t>
+            </a:r>
+          </a:p>
+          <a:p>
+            <a:pPr marL="171450" indent="-171450">
+              <a:buFontTx/>
               <a:buChar char="-"/>
             </a:pPr>
             <a:r>
-              <a:rPr lang="en-US" dirty="0">
-                <a:solidFill>
-                  <a:schemeClr val="dk1"/>
-                </a:solidFill>
+              <a:rPr lang="en-US" sz="1800" b="0" i="0" u="none" strike="noStrike" baseline="0" dirty="0">
+                <a:solidFill>
+                  <a:srgbClr val="000000"/>
+                </a:solidFill>
+                <a:latin typeface="AAAAAB+TimesNewRomanPSMT"/>
               </a:rPr>
-              <a:t>Convergence - Overfitting: Discuss the possibility of overfitting or underfitting based on the accuracy and loss curves. Overfitting occurs when the model performs well on the training data but fails to generalize to new data</a:t>
-            </a:r>
-          </a:p>
-          <a:p>
-            <a:pPr marL="457200" lvl="0" indent="-298450" algn="l" rtl="0">
-              <a:lnSpc>
-                <a:spcPct val="100000"/>
-              </a:lnSpc>
-              <a:spcBef>
-                <a:spcPts val="0"/>
-              </a:spcBef>
-              <a:spcAft>
-                <a:spcPts val="0"/>
-              </a:spcAft>
-              <a:buClr>
-                <a:schemeClr val="dk1"/>
-              </a:buClr>
-              <a:buSzPts val="1100"/>
-              <a:buChar char="-"/>
-            </a:pPr>
-            <a:r>
-              <a:rPr lang="en-US" dirty="0">
-                <a:solidFill>
-                  <a:schemeClr val="dk1"/>
-                </a:solidFill>
+              <a:t>Non-lab recording: Contains </a:t>
+            </a:r>
+            <a:r>
+              <a:rPr lang="en-US" sz="1800" b="0" i="0" u="none" strike="noStrike" baseline="0" dirty="0" err="1">
+                <a:solidFill>
+                  <a:srgbClr val="000000"/>
+                </a:solidFill>
+                <a:latin typeface="AAAAAB+TimesNewRomanPSMT"/>
               </a:rPr>
-              <a:t>Fluctuation: If there are plateaus or fluctuations in the accuracy and loss graphs, explain the potential reasons behind them, Fluctuations may suggest that the model is struggling to converge.</a:t>
-            </a:r>
-          </a:p>
-          <a:p>
+              <a:t>uterances</a:t>
+            </a:r>
+            <a:r>
+              <a:rPr lang="en-US" sz="1800" b="0" i="0" u="none" strike="noStrike" baseline="0" dirty="0">
+                <a:solidFill>
+                  <a:srgbClr val="000000"/>
+                </a:solidFill>
+                <a:latin typeface="AAAAAB+TimesNewRomanPSMT"/>
+              </a:rPr>
+              <a:t> that reflect emotions involuntarily in natural scenarios.</a:t>
+            </a:r>
             <a:endParaRPr lang="en-US" dirty="0"/>
           </a:p>
         </p:txBody>
@@ -2299,7 +2690,7 @@
           <a:p>
             <a:fld id="{E10FB84E-2805-4468-A00F-CFA6F38630CE}" type="slidenum">
               <a:rPr lang="en-US" smtClean="0"/>
-              <a:t>12</a:t>
+              <a:t>9</a:t>
             </a:fld>
             <a:endParaRPr lang="en-US"/>
           </a:p>
@@ -2308,7 +2699,7 @@
     </p:spTree>
     <p:extLst>
       <p:ext uri="{BB962C8B-B14F-4D97-AF65-F5344CB8AC3E}">
-        <p14:creationId xmlns:p14="http://schemas.microsoft.com/office/powerpoint/2010/main" val="1261887700"/>
+        <p14:creationId xmlns:p14="http://schemas.microsoft.com/office/powerpoint/2010/main" val="3059585611"/>
       </p:ext>
     </p:extLst>
   </p:cSld>
@@ -2362,111 +2753,89 @@
           <a:bodyPr/>
           <a:lstStyle/>
           <a:p>
-            <a:pPr marL="457200" lvl="0" indent="-298450" algn="l" rtl="0">
-              <a:lnSpc>
-                <a:spcPct val="100000"/>
-              </a:lnSpc>
-              <a:spcBef>
-                <a:spcPts val="0"/>
-              </a:spcBef>
-              <a:spcAft>
-                <a:spcPts val="0"/>
-              </a:spcAft>
-              <a:buClr>
-                <a:schemeClr val="dk1"/>
-              </a:buClr>
-              <a:buSzPts val="1100"/>
-              <a:buChar char="-"/>
+            <a:pPr marL="0" marR="0" lvl="0" indent="0" algn="l" defTabSz="914400" rtl="0" eaLnBrk="1" fontAlgn="auto" latinLnBrk="0" hangingPunct="1">
+              <a:lnSpc>
+                <a:spcPct val="100000"/>
+              </a:lnSpc>
+              <a:spcBef>
+                <a:spcPts val="0"/>
+              </a:spcBef>
+              <a:spcAft>
+                <a:spcPts val="0"/>
+              </a:spcAft>
+              <a:buClrTx/>
+              <a:buSzTx/>
+              <a:buFont typeface="Arial" panose="020B0604020202020204" pitchFamily="34" charset="0"/>
+              <a:buNone/>
+              <a:tabLst/>
+              <a:defRPr/>
             </a:pPr>
             <a:r>
-              <a:rPr lang="en-US" dirty="0">
-                <a:solidFill>
-                  <a:schemeClr val="dk1"/>
-                </a:solidFill>
+              <a:rPr lang="en-US" sz="1800" b="0" i="0" u="none" strike="noStrike" baseline="0" dirty="0">
+                <a:solidFill>
+                  <a:srgbClr val="000000"/>
+                </a:solidFill>
+                <a:latin typeface="AAAAAB+TimesNewRomanPSMT"/>
               </a:rPr>
-              <a:t>Accuracy trend: Explain how the accuracy metric reflects the model's ability to correctly classify emotions in the audio data.</a:t>
-            </a:r>
-          </a:p>
-          <a:p>
-            <a:pPr marL="457200" lvl="0" indent="-298450" algn="l" rtl="0">
-              <a:lnSpc>
-                <a:spcPct val="100000"/>
-              </a:lnSpc>
-              <a:spcBef>
-                <a:spcPts val="0"/>
-              </a:spcBef>
-              <a:spcAft>
-                <a:spcPts val="0"/>
-              </a:spcAft>
-              <a:buClr>
-                <a:schemeClr val="dk1"/>
-              </a:buClr>
-              <a:buSzPts val="1100"/>
-              <a:buChar char="-"/>
+              <a:t>- Tracking the training process of a model could help identify and address the overfitting and underfitting in the data, also </a:t>
+            </a:r>
+            <a:r>
+              <a:rPr lang="en-US" b="0" i="0" dirty="0">
+                <a:solidFill>
+                  <a:srgbClr val="D1D5DB"/>
+                </a:solidFill>
+                <a:effectLst/>
+                <a:latin typeface="Söhne"/>
+              </a:rPr>
+              <a:t>determine whether the model has converged or if it requires additional training iterations.</a:t>
+            </a:r>
+            <a:endParaRPr lang="en-US" dirty="0"/>
+          </a:p>
+          <a:p>
+            <a:pPr marL="0" marR="0" lvl="0" indent="0" algn="l" defTabSz="914400" rtl="0" eaLnBrk="1" fontAlgn="auto" latinLnBrk="0" hangingPunct="1">
+              <a:lnSpc>
+                <a:spcPct val="100000"/>
+              </a:lnSpc>
+              <a:spcBef>
+                <a:spcPts val="0"/>
+              </a:spcBef>
+              <a:spcAft>
+                <a:spcPts val="0"/>
+              </a:spcAft>
+              <a:buClrTx/>
+              <a:buSzTx/>
+              <a:buFontTx/>
+              <a:buNone/>
+              <a:tabLst/>
+              <a:defRPr/>
             </a:pPr>
             <a:r>
-              <a:rPr lang="en-US" dirty="0">
-                <a:solidFill>
-                  <a:schemeClr val="dk1"/>
-                </a:solidFill>
-              </a:rPr>
-              <a:t>Loss trend: Explain that loss is a measure of how well the model is fitting the training data. A decreasing loss indicates that the model is learning and converging towards optimal performance.</a:t>
-            </a:r>
-          </a:p>
-          <a:p>
-            <a:pPr marL="457200" lvl="0" indent="-298450" algn="l" rtl="0">
-              <a:lnSpc>
-                <a:spcPct val="100000"/>
-              </a:lnSpc>
-              <a:spcBef>
-                <a:spcPts val="0"/>
-              </a:spcBef>
-              <a:spcAft>
-                <a:spcPts val="0"/>
-              </a:spcAft>
-              <a:buClr>
-                <a:schemeClr val="dk1"/>
-              </a:buClr>
-              <a:buSzPts val="1100"/>
-              <a:buChar char="-"/>
+              <a:rPr lang="en-US" dirty="0"/>
+              <a:t>- Conf Matrix: provides insights into the model's ability to correctly classify different classes and helps assess its performance in terms of precision (row), recall (column), and F1 score (balanced representation of precision &amp; recall).</a:t>
+            </a:r>
+          </a:p>
+          <a:p>
+            <a:pPr marL="0" marR="0" lvl="0" indent="0" algn="l" defTabSz="914400" rtl="0" eaLnBrk="1" fontAlgn="auto" latinLnBrk="0" hangingPunct="1">
+              <a:lnSpc>
+                <a:spcPct val="100000"/>
+              </a:lnSpc>
+              <a:spcBef>
+                <a:spcPts val="0"/>
+              </a:spcBef>
+              <a:spcAft>
+                <a:spcPts val="0"/>
+              </a:spcAft>
+              <a:buClrTx/>
+              <a:buSzTx/>
+              <a:buFontTx/>
+              <a:buNone/>
+              <a:tabLst/>
+              <a:defRPr/>
             </a:pPr>
             <a:r>
-              <a:rPr lang="en-US" dirty="0">
-                <a:solidFill>
-                  <a:schemeClr val="dk1"/>
-                </a:solidFill>
-              </a:rPr>
-              <a:t>Convergence - Overfitting: Discuss the possibility of overfitting or underfitting based on the accuracy and loss curves. Overfitting occurs when the model performs well on the training data but fails to generalize to new data</a:t>
-            </a:r>
-          </a:p>
-          <a:p>
-            <a:pPr marL="457200" lvl="0" indent="-298450" algn="l" rtl="0">
-              <a:lnSpc>
-                <a:spcPct val="100000"/>
-              </a:lnSpc>
-              <a:spcBef>
-                <a:spcPts val="0"/>
-              </a:spcBef>
-              <a:spcAft>
-                <a:spcPts val="0"/>
-              </a:spcAft>
-              <a:buClr>
-                <a:schemeClr val="dk1"/>
-              </a:buClr>
-              <a:buSzPts val="1100"/>
-              <a:buChar char="-"/>
-            </a:pPr>
-            <a:r>
-              <a:rPr lang="en-US" dirty="0">
-                <a:solidFill>
-                  <a:schemeClr val="dk1"/>
-                </a:solidFill>
-              </a:rPr>
-              <a:t>Fluctuation: If there are plateaus or fluctuations in the accuracy and loss graphs, explain the potential reasons behind them, Fluctuations may suggest that the model is struggling to converge.</a:t>
-            </a:r>
-          </a:p>
-          <a:p>
-            <a:endParaRPr lang="en-US" dirty="0"/>
+              <a:rPr lang="en-US" dirty="0"/>
+              <a:t>- Accuracy measures the overall performance of a model by dividing the number of correct predictions by the total number of predictions, it is often misleading for imbalanced dataset scenario. </a:t>
+            </a:r>
           </a:p>
         </p:txBody>
       </p:sp>
@@ -2487,7 +2856,7 @@
           <a:p>
             <a:fld id="{E10FB84E-2805-4468-A00F-CFA6F38630CE}" type="slidenum">
               <a:rPr lang="en-US" smtClean="0"/>
-              <a:t>13</a:t>
+              <a:t>10</a:t>
             </a:fld>
             <a:endParaRPr lang="en-US"/>
           </a:p>
@@ -2496,7 +2865,7 @@
     </p:spTree>
     <p:extLst>
       <p:ext uri="{BB962C8B-B14F-4D97-AF65-F5344CB8AC3E}">
-        <p14:creationId xmlns:p14="http://schemas.microsoft.com/office/powerpoint/2010/main" val="3275975185"/>
+        <p14:creationId xmlns:p14="http://schemas.microsoft.com/office/powerpoint/2010/main" val="156311942"/>
       </p:ext>
     </p:extLst>
   </p:cSld>
@@ -2624,7 +2993,23 @@
                   <a:schemeClr val="dk1"/>
                 </a:solidFill>
               </a:rPr>
-              <a:t>Convergence - Overfitting: Discuss the possibility of overfitting or underfitting based on the accuracy and loss curves. Overfitting occurs when the model performs well on the training data but fails to generalize to new data</a:t>
+              <a:t>Convergence - Overfitting: Discuss the possibility of overfitting or underfitting based on the accuracy </a:t>
+            </a:r>
+            <a:r>
+              <a:rPr lang="en-US">
+                <a:solidFill>
+                  <a:schemeClr val="dk1"/>
+                </a:solidFill>
+              </a:rPr>
+              <a:t>and loss </a:t>
+            </a:r>
+            <a:r>
+              <a:rPr lang="en-US" dirty="0">
+                <a:solidFill>
+                  <a:schemeClr val="dk1"/>
+                </a:solidFill>
+              </a:rPr>
+              <a:t>curves. Overfitting occurs when the model performs well on the training data but fails to generalize to new data</a:t>
             </a:r>
           </a:p>
           <a:p>
@@ -2652,6 +3037,9 @@
               </a:rPr>
               <a:t>Fluctuation: If there are plateaus or fluctuations in the accuracy and loss graphs, explain the potential reasons behind them, Fluctuations may suggest that the model is struggling to converge.</a:t>
             </a:r>
+          </a:p>
+          <a:p>
+            <a:endParaRPr lang="en-US" dirty="0"/>
           </a:p>
         </p:txBody>
       </p:sp>
@@ -2672,7 +3060,7 @@
           <a:p>
             <a:fld id="{E10FB84E-2805-4468-A00F-CFA6F38630CE}" type="slidenum">
               <a:rPr lang="en-US" smtClean="0"/>
-              <a:t>14</a:t>
+              <a:t>12</a:t>
             </a:fld>
             <a:endParaRPr lang="en-US"/>
           </a:p>
@@ -2681,7 +3069,7 @@
     </p:spTree>
     <p:extLst>
       <p:ext uri="{BB962C8B-B14F-4D97-AF65-F5344CB8AC3E}">
-        <p14:creationId xmlns:p14="http://schemas.microsoft.com/office/powerpoint/2010/main" val="4223439829"/>
+        <p14:creationId xmlns:p14="http://schemas.microsoft.com/office/powerpoint/2010/main" val="1261887700"/>
       </p:ext>
     </p:extLst>
   </p:cSld>
@@ -2736,6 +3124,9 @@
           <a:lstStyle/>
           <a:p>
             <a:pPr marL="457200" lvl="0" indent="-298450" algn="l" rtl="0">
+              <a:lnSpc>
+                <a:spcPct val="100000"/>
+              </a:lnSpc>
               <a:spcBef>
                 <a:spcPts val="0"/>
               </a:spcBef>
@@ -2754,11 +3145,14 @@
                   <a:schemeClr val="dk1"/>
                 </a:solidFill>
               </a:rPr>
-              <a:t>Column is model prediction, row is ground truth</a:t>
+              <a:t>Accuracy trend: Explain how the accuracy metric reflects the model's ability to correctly classify emotions in the audio data.</a:t>
             </a:r>
           </a:p>
           <a:p>
             <a:pPr marL="457200" lvl="0" indent="-298450" algn="l" rtl="0">
+              <a:lnSpc>
+                <a:spcPct val="100000"/>
+              </a:lnSpc>
               <a:spcBef>
                 <a:spcPts val="0"/>
               </a:spcBef>
@@ -2777,11 +3171,14 @@
                   <a:schemeClr val="dk1"/>
                 </a:solidFill>
               </a:rPr>
-              <a:t>Focus on the off-diagonal elements and discuss the most common types of misclassifications</a:t>
+              <a:t>Loss trend: Explain that loss is a measure of how well the model is fitting the training data. A decreasing loss indicates that the model is learning and converging towards optimal performance.</a:t>
             </a:r>
           </a:p>
           <a:p>
             <a:pPr marL="457200" lvl="0" indent="-298450" algn="l" rtl="0">
+              <a:lnSpc>
+                <a:spcPct val="100000"/>
+              </a:lnSpc>
               <a:spcBef>
                 <a:spcPts val="0"/>
               </a:spcBef>
@@ -2800,11 +3197,14 @@
                   <a:schemeClr val="dk1"/>
                 </a:solidFill>
               </a:rPr>
-              <a:t>Discuss the emotions for which the model performs well and those for which it struggles</a:t>
+              <a:t>Convergence - Overfitting: Discuss the possibility of overfitting or underfitting based on the accuracy and loss curves. Overfitting occurs when the model performs well on the training data but fails to generalize to new data</a:t>
             </a:r>
           </a:p>
           <a:p>
             <a:pPr marL="457200" lvl="0" indent="-298450" algn="l" rtl="0">
+              <a:lnSpc>
+                <a:spcPct val="100000"/>
+              </a:lnSpc>
               <a:spcBef>
                 <a:spcPts val="0"/>
               </a:spcBef>
@@ -2823,8 +3223,11 @@
                   <a:schemeClr val="dk1"/>
                 </a:solidFill>
               </a:rPr>
-              <a:t>Discuss on the classification report</a:t>
-            </a:r>
+              <a:t>Fluctuation: If there are plateaus or fluctuations in the accuracy and loss graphs, explain the potential reasons behind them, Fluctuations may suggest that the model is struggling to converge.</a:t>
+            </a:r>
+          </a:p>
+          <a:p>
+            <a:endParaRPr lang="en-US" dirty="0"/>
           </a:p>
         </p:txBody>
       </p:sp>
@@ -2845,7 +3248,7 @@
           <a:p>
             <a:fld id="{E10FB84E-2805-4468-A00F-CFA6F38630CE}" type="slidenum">
               <a:rPr lang="en-US" smtClean="0"/>
-              <a:t>16</a:t>
+              <a:t>13</a:t>
             </a:fld>
             <a:endParaRPr lang="en-US"/>
           </a:p>
@@ -2854,7 +3257,7 @@
     </p:spTree>
     <p:extLst>
       <p:ext uri="{BB962C8B-B14F-4D97-AF65-F5344CB8AC3E}">
-        <p14:creationId xmlns:p14="http://schemas.microsoft.com/office/powerpoint/2010/main" val="1658395778"/>
+        <p14:creationId xmlns:p14="http://schemas.microsoft.com/office/powerpoint/2010/main" val="3275975185"/>
       </p:ext>
     </p:extLst>
   </p:cSld>
@@ -2995,7 +3398,7 @@
           <a:p>
             <a:fld id="{82E1281C-38DA-4818-8C55-31099151AAF6}" type="datetimeFigureOut">
               <a:rPr lang="id-ID" smtClean="0"/>
-              <a:t>16/06/23</a:t>
+              <a:t>19/06/2023</a:t>
             </a:fld>
             <a:endParaRPr lang="id-ID"/>
           </a:p>
@@ -3165,7 +3568,7 @@
           <a:p>
             <a:fld id="{82E1281C-38DA-4818-8C55-31099151AAF6}" type="datetimeFigureOut">
               <a:rPr lang="id-ID" smtClean="0"/>
-              <a:t>16/06/23</a:t>
+              <a:t>19/06/2023</a:t>
             </a:fld>
             <a:endParaRPr lang="id-ID"/>
           </a:p>
@@ -3345,7 +3748,7 @@
           <a:p>
             <a:fld id="{82E1281C-38DA-4818-8C55-31099151AAF6}" type="datetimeFigureOut">
               <a:rPr lang="id-ID" smtClean="0"/>
-              <a:t>16/06/23</a:t>
+              <a:t>19/06/2023</a:t>
             </a:fld>
             <a:endParaRPr lang="id-ID"/>
           </a:p>
@@ -4416,7 +4819,7 @@
                 </a:solidFill>
               </a:rPr>
               <a:pPr/>
-              <a:t>6/16/23</a:t>
+              <a:t>6/19/2023</a:t>
             </a:fld>
             <a:endParaRPr lang="en-US">
               <a:solidFill>
@@ -4646,7 +5049,7 @@
                 </a:solidFill>
               </a:rPr>
               <a:pPr/>
-              <a:t>6/16/23</a:t>
+              <a:t>6/19/2023</a:t>
             </a:fld>
             <a:endParaRPr lang="en-US">
               <a:solidFill>
@@ -4953,7 +5356,7 @@
                 </a:solidFill>
               </a:rPr>
               <a:pPr/>
-              <a:t>6/16/23</a:t>
+              <a:t>6/19/2023</a:t>
             </a:fld>
             <a:endParaRPr lang="en-US">
               <a:solidFill>
@@ -5250,7 +5653,7 @@
                 </a:solidFill>
               </a:rPr>
               <a:pPr/>
-              <a:t>6/16/23</a:t>
+              <a:t>6/19/2023</a:t>
             </a:fld>
             <a:endParaRPr lang="en-US">
               <a:solidFill>
@@ -5694,7 +6097,7 @@
                 </a:solidFill>
               </a:rPr>
               <a:pPr/>
-              <a:t>6/16/23</a:t>
+              <a:t>6/19/2023</a:t>
             </a:fld>
             <a:endParaRPr lang="en-US">
               <a:solidFill>
@@ -5867,7 +6270,7 @@
                 </a:solidFill>
               </a:rPr>
               <a:pPr/>
-              <a:t>6/16/23</a:t>
+              <a:t>6/19/2023</a:t>
             </a:fld>
             <a:endParaRPr lang="en-US">
               <a:solidFill>
@@ -6012,7 +6415,7 @@
                 </a:solidFill>
               </a:rPr>
               <a:pPr/>
-              <a:t>6/16/23</a:t>
+              <a:t>6/19/2023</a:t>
             </a:fld>
             <a:endParaRPr lang="en-US">
               <a:solidFill>
@@ -6309,7 +6712,7 @@
           <a:p>
             <a:fld id="{82E1281C-38DA-4818-8C55-31099151AAF6}" type="datetimeFigureOut">
               <a:rPr lang="id-ID" smtClean="0"/>
-              <a:t>16/06/23</a:t>
+              <a:t>19/06/2023</a:t>
             </a:fld>
             <a:endParaRPr lang="id-ID"/>
           </a:p>
@@ -6615,7 +7018,7 @@
                 </a:solidFill>
               </a:rPr>
               <a:pPr/>
-              <a:t>6/16/23</a:t>
+              <a:t>6/19/2023</a:t>
             </a:fld>
             <a:endParaRPr lang="en-US">
               <a:solidFill>
@@ -6935,7 +7338,7 @@
                 </a:solidFill>
               </a:rPr>
               <a:pPr/>
-              <a:t>6/16/23</a:t>
+              <a:t>6/19/2023</a:t>
             </a:fld>
             <a:endParaRPr lang="en-US">
               <a:solidFill>
@@ -7165,7 +7568,7 @@
                 </a:solidFill>
               </a:rPr>
               <a:pPr/>
-              <a:t>6/16/23</a:t>
+              <a:t>6/19/2023</a:t>
             </a:fld>
             <a:endParaRPr lang="en-US">
               <a:solidFill>
@@ -7405,7 +7808,7 @@
                 </a:solidFill>
               </a:rPr>
               <a:pPr/>
-              <a:t>6/16/23</a:t>
+              <a:t>6/19/2023</a:t>
             </a:fld>
             <a:endParaRPr lang="en-US">
               <a:solidFill>
@@ -7578,7 +7981,7 @@
                 </a:solidFill>
               </a:rPr>
               <a:pPr/>
-              <a:t>6/16/23</a:t>
+              <a:t>6/19/2023</a:t>
             </a:fld>
             <a:endParaRPr lang="en-US">
               <a:solidFill>
@@ -7861,7 +8264,7 @@
           <a:p>
             <a:fld id="{82E1281C-38DA-4818-8C55-31099151AAF6}" type="datetimeFigureOut">
               <a:rPr lang="id-ID" smtClean="0"/>
-              <a:t>16/06/23</a:t>
+              <a:t>19/06/2023</a:t>
             </a:fld>
             <a:endParaRPr lang="id-ID"/>
           </a:p>
@@ -8093,7 +8496,7 @@
           <a:p>
             <a:fld id="{82E1281C-38DA-4818-8C55-31099151AAF6}" type="datetimeFigureOut">
               <a:rPr lang="id-ID" smtClean="0"/>
-              <a:t>16/06/23</a:t>
+              <a:t>19/06/2023</a:t>
             </a:fld>
             <a:endParaRPr lang="id-ID"/>
           </a:p>
@@ -8460,7 +8863,7 @@
           <a:p>
             <a:fld id="{82E1281C-38DA-4818-8C55-31099151AAF6}" type="datetimeFigureOut">
               <a:rPr lang="id-ID" smtClean="0"/>
-              <a:t>16/06/23</a:t>
+              <a:t>19/06/2023</a:t>
             </a:fld>
             <a:endParaRPr lang="id-ID"/>
           </a:p>
@@ -8578,7 +8981,7 @@
           <a:p>
             <a:fld id="{82E1281C-38DA-4818-8C55-31099151AAF6}" type="datetimeFigureOut">
               <a:rPr lang="id-ID" smtClean="0"/>
-              <a:t>16/06/23</a:t>
+              <a:t>19/06/2023</a:t>
             </a:fld>
             <a:endParaRPr lang="id-ID"/>
           </a:p>
@@ -8673,7 +9076,7 @@
           <a:p>
             <a:fld id="{82E1281C-38DA-4818-8C55-31099151AAF6}" type="datetimeFigureOut">
               <a:rPr lang="id-ID" smtClean="0"/>
-              <a:t>16/06/23</a:t>
+              <a:t>19/06/2023</a:t>
             </a:fld>
             <a:endParaRPr lang="id-ID"/>
           </a:p>
@@ -8950,7 +9353,7 @@
           <a:p>
             <a:fld id="{82E1281C-38DA-4818-8C55-31099151AAF6}" type="datetimeFigureOut">
               <a:rPr lang="id-ID" smtClean="0"/>
-              <a:t>16/06/23</a:t>
+              <a:t>19/06/2023</a:t>
             </a:fld>
             <a:endParaRPr lang="id-ID"/>
           </a:p>
@@ -9203,7 +9606,7 @@
           <a:p>
             <a:fld id="{82E1281C-38DA-4818-8C55-31099151AAF6}" type="datetimeFigureOut">
               <a:rPr lang="id-ID" smtClean="0"/>
-              <a:t>16/06/23</a:t>
+              <a:t>19/06/2023</a:t>
             </a:fld>
             <a:endParaRPr lang="id-ID"/>
           </a:p>
@@ -9425,7 +9828,7 @@
           <a:p>
             <a:fld id="{82E1281C-38DA-4818-8C55-31099151AAF6}" type="datetimeFigureOut">
               <a:rPr lang="id-ID" smtClean="0"/>
-              <a:t>16/06/23</a:t>
+              <a:t>19/06/2023</a:t>
             </a:fld>
             <a:endParaRPr lang="id-ID"/>
           </a:p>
@@ -9998,7 +10401,7 @@
                 </a:solidFill>
               </a:rPr>
               <a:pPr/>
-              <a:t>6/16/23</a:t>
+              <a:t>6/19/2023</a:t>
             </a:fld>
             <a:endParaRPr lang="en-US">
               <a:solidFill>
@@ -16733,7 +17136,7 @@
           <p:nvPr/>
         </p:nvPicPr>
         <p:blipFill>
-          <a:blip r:embed="rId2">
+          <a:blip r:embed="rId3">
             <a:extLst>
               <a:ext uri="{28A0092B-C50C-407E-A947-70E740481C1C}">
                 <a14:useLocalDpi xmlns:a14="http://schemas.microsoft.com/office/drawing/2010/main" val="0"/>
@@ -20481,7 +20884,7 @@
         </p:nvSpPr>
         <p:spPr>
           <a:xfrm>
-            <a:off x="1456857" y="2515932"/>
+            <a:off x="1456857" y="2618892"/>
             <a:ext cx="2692475" cy="1040587"/>
           </a:xfrm>
           <a:prstGeom prst="rect">
@@ -20777,7 +21180,7 @@
                 <a:latin typeface="+mn-lt"/>
                 <a:sym typeface="DM Sans"/>
               </a:rPr>
-              <a:t>Contain diverse collection of acted emotional expressions, including speech and facial expressions, from professional actors.</a:t>
+              <a:t>The dataset contains 7,442 clips of audio and video recordings of various everyday scenarios, such as people talking, laughing, and singing in various environments.</a:t>
             </a:r>
           </a:p>
         </p:txBody>
@@ -21121,8 +21524,8 @@
         </p:nvSpPr>
         <p:spPr>
           <a:xfrm>
-            <a:off x="3698700" y="4350727"/>
-            <a:ext cx="3207407" cy="1238562"/>
+            <a:off x="3650556" y="4413604"/>
+            <a:ext cx="3297420" cy="972005"/>
           </a:xfrm>
           <a:prstGeom prst="rect">
             <a:avLst/>
@@ -21417,7 +21820,7 @@
                 <a:latin typeface="+mn-lt"/>
                 <a:sym typeface="DM Sans"/>
               </a:rPr>
-              <a:t>Audio Recordings were recorded in a laboratory environment with high-quality audio-visual equipment, processed and labelled, resulting in a high-quality audio data.</a:t>
+              <a:t>Dataset features 4 male actors expressing different emotions with a spoken British English accent that contains a total of 480 audio recordings.</a:t>
             </a:r>
           </a:p>
         </p:txBody>
@@ -21761,8 +22164,8 @@
         </p:nvSpPr>
         <p:spPr>
           <a:xfrm>
-            <a:off x="6025685" y="2502612"/>
-            <a:ext cx="3058922" cy="1040587"/>
+            <a:off x="6025685" y="2559012"/>
+            <a:ext cx="3058922" cy="926388"/>
           </a:xfrm>
           <a:prstGeom prst="rect">
             <a:avLst/>
@@ -22057,7 +22460,7 @@
                 <a:latin typeface="+mn-lt"/>
                 <a:sym typeface="DM Sans"/>
               </a:rPr>
-              <a:t>Provide balanced representation of male and female voices, creating comprehensive sample that represents emotional expressions across genders.</a:t>
+              <a:t>The dataset works with balanced representation of male and female voices consisting of 1,470 recordings from professional actors and actresses.</a:t>
             </a:r>
           </a:p>
         </p:txBody>

</xml_diff>

<commit_message>
finished sidang amin ngentot
</commit_message>
<xml_diff>
--- a/Submit Sidang/05111942000001-Adam Satria Adidarma-Presentasi TA.pptx
+++ b/Submit Sidang/05111942000001-Adam Satria Adidarma-Presentasi TA.pptx
@@ -322,7 +322,7 @@
           <a:p>
             <a:fld id="{2D8DF117-F36D-4197-BD9C-D7ED3849AC71}" type="datetimeFigureOut">
               <a:rPr lang="en-US" smtClean="0"/>
-              <a:t>6/19/23</a:t>
+              <a:t>6/20/2023</a:t>
             </a:fld>
             <a:endParaRPr lang="en-US"/>
           </a:p>
@@ -487,7 +487,7 @@
           <a:p>
             <a:fld id="{F2C69B06-AE52-4203-9155-65C4258A32D1}" type="datetimeFigureOut">
               <a:rPr lang="en-US" smtClean="0"/>
-              <a:t>6/19/23</a:t>
+              <a:t>6/20/2023</a:t>
             </a:fld>
             <a:endParaRPr lang="en-US"/>
           </a:p>
@@ -1103,6 +1103,35 @@
           <a:bodyPr/>
           <a:lstStyle/>
           <a:p>
+            <a:pPr marL="158750" lvl="0" indent="0" algn="l" rtl="0">
+              <a:spcBef>
+                <a:spcPts val="0"/>
+              </a:spcBef>
+              <a:spcAft>
+                <a:spcPts val="0"/>
+              </a:spcAft>
+              <a:buClr>
+                <a:schemeClr val="dk1"/>
+              </a:buClr>
+              <a:buSzPts val="1100"/>
+              <a:buNone/>
+            </a:pPr>
+            <a:r>
+              <a:rPr lang="en-US" sz="1800" b="0" i="0" u="none" strike="noStrike" baseline="0" dirty="0">
+                <a:solidFill>
+                  <a:srgbClr val="000000"/>
+                </a:solidFill>
+                <a:latin typeface="AAAAAB+TimesNewRomanPSMT"/>
+              </a:rPr>
+              <a:t>The results showed that the model had different levels of confusion across the different datasets:</a:t>
+            </a:r>
+            <a:endParaRPr lang="en-US" dirty="0">
+              <a:solidFill>
+                <a:schemeClr val="dk1"/>
+              </a:solidFill>
+            </a:endParaRPr>
+          </a:p>
+          <a:p>
             <a:pPr marL="457200" lvl="0" indent="-298450" algn="l" rtl="0">
               <a:spcBef>
                 <a:spcPts val="0"/>
@@ -1145,7 +1174,7 @@
                   <a:schemeClr val="dk1"/>
                 </a:solidFill>
               </a:rPr>
-              <a:t>Focus on the off-diagonal elements and discuss the most common types of misclassifications</a:t>
+              <a:t>Neutral highest TP, Happy lowest TP. This is because a lot of misclassification distributed across emotions.</a:t>
             </a:r>
           </a:p>
           <a:p>
@@ -1168,7 +1197,7 @@
                   <a:schemeClr val="dk1"/>
                 </a:solidFill>
               </a:rPr>
-              <a:t>Discuss the emotions for which the model performs well and those for which it struggles</a:t>
+              <a:t>High level of confusion between sad and neutral emotion.</a:t>
             </a:r>
           </a:p>
           <a:p>
@@ -1191,7 +1220,7 @@
                   <a:schemeClr val="dk1"/>
                 </a:solidFill>
               </a:rPr>
-              <a:t>Discuss on the classification report</a:t>
+              <a:t>Angry emotion highest f1-score due to its high precision score.</a:t>
             </a:r>
           </a:p>
         </p:txBody>
@@ -1295,7 +1324,7 @@
                   <a:schemeClr val="dk1"/>
                 </a:solidFill>
               </a:rPr>
-              <a:t>Column is model prediction, row is ground truth</a:t>
+              <a:t>Angry &amp; Fear highest TP, Sad lowest TP. High confusion between sad and neutral emotions again.</a:t>
             </a:r>
           </a:p>
           <a:p>
@@ -1318,7 +1347,7 @@
                   <a:schemeClr val="dk1"/>
                 </a:solidFill>
               </a:rPr>
-              <a:t>Focus on the off-diagonal elements and discuss the most common types of misclassifications</a:t>
+              <a:t>Angry has the highest f1-score due to its high precision score compared to fear which is the close second.</a:t>
             </a:r>
           </a:p>
           <a:p>
@@ -1341,30 +1370,7 @@
                   <a:schemeClr val="dk1"/>
                 </a:solidFill>
               </a:rPr>
-              <a:t>Discuss the emotions for which the model performs well and those for which it struggles</a:t>
-            </a:r>
-          </a:p>
-          <a:p>
-            <a:pPr marL="457200" lvl="0" indent="-298450" algn="l" rtl="0">
-              <a:spcBef>
-                <a:spcPts val="0"/>
-              </a:spcBef>
-              <a:spcAft>
-                <a:spcPts val="0"/>
-              </a:spcAft>
-              <a:buClr>
-                <a:schemeClr val="dk1"/>
-              </a:buClr>
-              <a:buSzPts val="1100"/>
-              <a:buChar char="-"/>
-            </a:pPr>
-            <a:r>
-              <a:rPr lang="en-US" dirty="0">
-                <a:solidFill>
-                  <a:schemeClr val="dk1"/>
-                </a:solidFill>
-              </a:rPr>
-              <a:t>Discuss on the classification report</a:t>
+              <a:t>Angry achieved perfect score in precision, meaning the model didn’t falsely classify this emotion into any other category.</a:t>
             </a:r>
           </a:p>
         </p:txBody>
@@ -1468,7 +1474,7 @@
                   <a:schemeClr val="dk1"/>
                 </a:solidFill>
               </a:rPr>
-              <a:t>Column is model prediction, row is ground truth</a:t>
+              <a:t>Angry lowest TP, Disgust &amp; Neutral highest TP. Angry is misclassified across fear, neutral, and sad.</a:t>
             </a:r>
           </a:p>
           <a:p>
@@ -1491,7 +1497,7 @@
                   <a:schemeClr val="dk1"/>
                 </a:solidFill>
               </a:rPr>
-              <a:t>Focus on the off-diagonal elements and discuss the most common types of misclassifications</a:t>
+              <a:t>Fear and Sad had a high level of confusion between each other.</a:t>
             </a:r>
           </a:p>
           <a:p>
@@ -1514,30 +1520,7 @@
                   <a:schemeClr val="dk1"/>
                 </a:solidFill>
               </a:rPr>
-              <a:t>Discuss the emotions for which the model performs well and those for which it struggles</a:t>
-            </a:r>
-          </a:p>
-          <a:p>
-            <a:pPr marL="457200" lvl="0" indent="-298450" algn="l" rtl="0">
-              <a:spcBef>
-                <a:spcPts val="0"/>
-              </a:spcBef>
-              <a:spcAft>
-                <a:spcPts val="0"/>
-              </a:spcAft>
-              <a:buClr>
-                <a:schemeClr val="dk1"/>
-              </a:buClr>
-              <a:buSzPts val="1100"/>
-              <a:buChar char="-"/>
-            </a:pPr>
-            <a:r>
-              <a:rPr lang="en-US" dirty="0">
-                <a:solidFill>
-                  <a:schemeClr val="dk1"/>
-                </a:solidFill>
-              </a:rPr>
-              <a:t>Discuss on the classification report</a:t>
+              <a:t>Disgust had the highest f1-score due to its high precision and recall scores in the predictions and Angry have the lowest score for this dataset.</a:t>
             </a:r>
           </a:p>
         </p:txBody>
@@ -3343,7 +3326,7 @@
           <a:p>
             <a:fld id="{82E1281C-38DA-4818-8C55-31099151AAF6}" type="datetimeFigureOut">
               <a:rPr lang="id-ID" smtClean="0"/>
-              <a:t>19/06/23</a:t>
+              <a:t>20/06/2023</a:t>
             </a:fld>
             <a:endParaRPr lang="id-ID"/>
           </a:p>
@@ -3513,7 +3496,7 @@
           <a:p>
             <a:fld id="{82E1281C-38DA-4818-8C55-31099151AAF6}" type="datetimeFigureOut">
               <a:rPr lang="id-ID" smtClean="0"/>
-              <a:t>19/06/23</a:t>
+              <a:t>20/06/2023</a:t>
             </a:fld>
             <a:endParaRPr lang="id-ID"/>
           </a:p>
@@ -3693,7 +3676,7 @@
           <a:p>
             <a:fld id="{82E1281C-38DA-4818-8C55-31099151AAF6}" type="datetimeFigureOut">
               <a:rPr lang="id-ID" smtClean="0"/>
-              <a:t>19/06/23</a:t>
+              <a:t>20/06/2023</a:t>
             </a:fld>
             <a:endParaRPr lang="id-ID"/>
           </a:p>
@@ -4764,7 +4747,7 @@
                 </a:solidFill>
               </a:rPr>
               <a:pPr/>
-              <a:t>6/19/23</a:t>
+              <a:t>6/20/2023</a:t>
             </a:fld>
             <a:endParaRPr lang="en-US">
               <a:solidFill>
@@ -4994,7 +4977,7 @@
                 </a:solidFill>
               </a:rPr>
               <a:pPr/>
-              <a:t>6/19/23</a:t>
+              <a:t>6/20/2023</a:t>
             </a:fld>
             <a:endParaRPr lang="en-US">
               <a:solidFill>
@@ -5301,7 +5284,7 @@
                 </a:solidFill>
               </a:rPr>
               <a:pPr/>
-              <a:t>6/19/23</a:t>
+              <a:t>6/20/2023</a:t>
             </a:fld>
             <a:endParaRPr lang="en-US">
               <a:solidFill>
@@ -5598,7 +5581,7 @@
                 </a:solidFill>
               </a:rPr>
               <a:pPr/>
-              <a:t>6/19/23</a:t>
+              <a:t>6/20/2023</a:t>
             </a:fld>
             <a:endParaRPr lang="en-US">
               <a:solidFill>
@@ -6042,7 +6025,7 @@
                 </a:solidFill>
               </a:rPr>
               <a:pPr/>
-              <a:t>6/19/23</a:t>
+              <a:t>6/20/2023</a:t>
             </a:fld>
             <a:endParaRPr lang="en-US">
               <a:solidFill>
@@ -6215,7 +6198,7 @@
                 </a:solidFill>
               </a:rPr>
               <a:pPr/>
-              <a:t>6/19/23</a:t>
+              <a:t>6/20/2023</a:t>
             </a:fld>
             <a:endParaRPr lang="en-US">
               <a:solidFill>
@@ -6360,7 +6343,7 @@
                 </a:solidFill>
               </a:rPr>
               <a:pPr/>
-              <a:t>6/19/23</a:t>
+              <a:t>6/20/2023</a:t>
             </a:fld>
             <a:endParaRPr lang="en-US">
               <a:solidFill>
@@ -6657,7 +6640,7 @@
           <a:p>
             <a:fld id="{82E1281C-38DA-4818-8C55-31099151AAF6}" type="datetimeFigureOut">
               <a:rPr lang="id-ID" smtClean="0"/>
-              <a:t>19/06/23</a:t>
+              <a:t>20/06/2023</a:t>
             </a:fld>
             <a:endParaRPr lang="id-ID"/>
           </a:p>
@@ -6963,7 +6946,7 @@
                 </a:solidFill>
               </a:rPr>
               <a:pPr/>
-              <a:t>6/19/23</a:t>
+              <a:t>6/20/2023</a:t>
             </a:fld>
             <a:endParaRPr lang="en-US">
               <a:solidFill>
@@ -7283,7 +7266,7 @@
                 </a:solidFill>
               </a:rPr>
               <a:pPr/>
-              <a:t>6/19/23</a:t>
+              <a:t>6/20/2023</a:t>
             </a:fld>
             <a:endParaRPr lang="en-US">
               <a:solidFill>
@@ -7513,7 +7496,7 @@
                 </a:solidFill>
               </a:rPr>
               <a:pPr/>
-              <a:t>6/19/23</a:t>
+              <a:t>6/20/2023</a:t>
             </a:fld>
             <a:endParaRPr lang="en-US">
               <a:solidFill>
@@ -7753,7 +7736,7 @@
                 </a:solidFill>
               </a:rPr>
               <a:pPr/>
-              <a:t>6/19/23</a:t>
+              <a:t>6/20/2023</a:t>
             </a:fld>
             <a:endParaRPr lang="en-US">
               <a:solidFill>
@@ -7926,7 +7909,7 @@
                 </a:solidFill>
               </a:rPr>
               <a:pPr/>
-              <a:t>6/19/23</a:t>
+              <a:t>6/20/2023</a:t>
             </a:fld>
             <a:endParaRPr lang="en-US">
               <a:solidFill>
@@ -8209,7 +8192,7 @@
           <a:p>
             <a:fld id="{82E1281C-38DA-4818-8C55-31099151AAF6}" type="datetimeFigureOut">
               <a:rPr lang="id-ID" smtClean="0"/>
-              <a:t>19/06/23</a:t>
+              <a:t>20/06/2023</a:t>
             </a:fld>
             <a:endParaRPr lang="id-ID"/>
           </a:p>
@@ -8441,7 +8424,7 @@
           <a:p>
             <a:fld id="{82E1281C-38DA-4818-8C55-31099151AAF6}" type="datetimeFigureOut">
               <a:rPr lang="id-ID" smtClean="0"/>
-              <a:t>19/06/23</a:t>
+              <a:t>20/06/2023</a:t>
             </a:fld>
             <a:endParaRPr lang="id-ID"/>
           </a:p>
@@ -8808,7 +8791,7 @@
           <a:p>
             <a:fld id="{82E1281C-38DA-4818-8C55-31099151AAF6}" type="datetimeFigureOut">
               <a:rPr lang="id-ID" smtClean="0"/>
-              <a:t>19/06/23</a:t>
+              <a:t>20/06/2023</a:t>
             </a:fld>
             <a:endParaRPr lang="id-ID"/>
           </a:p>
@@ -8926,7 +8909,7 @@
           <a:p>
             <a:fld id="{82E1281C-38DA-4818-8C55-31099151AAF6}" type="datetimeFigureOut">
               <a:rPr lang="id-ID" smtClean="0"/>
-              <a:t>19/06/23</a:t>
+              <a:t>20/06/2023</a:t>
             </a:fld>
             <a:endParaRPr lang="id-ID"/>
           </a:p>
@@ -9021,7 +9004,7 @@
           <a:p>
             <a:fld id="{82E1281C-38DA-4818-8C55-31099151AAF6}" type="datetimeFigureOut">
               <a:rPr lang="id-ID" smtClean="0"/>
-              <a:t>19/06/23</a:t>
+              <a:t>20/06/2023</a:t>
             </a:fld>
             <a:endParaRPr lang="id-ID"/>
           </a:p>
@@ -9298,7 +9281,7 @@
           <a:p>
             <a:fld id="{82E1281C-38DA-4818-8C55-31099151AAF6}" type="datetimeFigureOut">
               <a:rPr lang="id-ID" smtClean="0"/>
-              <a:t>19/06/23</a:t>
+              <a:t>20/06/2023</a:t>
             </a:fld>
             <a:endParaRPr lang="id-ID"/>
           </a:p>
@@ -9551,7 +9534,7 @@
           <a:p>
             <a:fld id="{82E1281C-38DA-4818-8C55-31099151AAF6}" type="datetimeFigureOut">
               <a:rPr lang="id-ID" smtClean="0"/>
-              <a:t>19/06/23</a:t>
+              <a:t>20/06/2023</a:t>
             </a:fld>
             <a:endParaRPr lang="id-ID"/>
           </a:p>
@@ -9773,7 +9756,7 @@
           <a:p>
             <a:fld id="{82E1281C-38DA-4818-8C55-31099151AAF6}" type="datetimeFigureOut">
               <a:rPr lang="id-ID" smtClean="0"/>
-              <a:t>19/06/23</a:t>
+              <a:t>20/06/2023</a:t>
             </a:fld>
             <a:endParaRPr lang="id-ID"/>
           </a:p>
@@ -10346,7 +10329,7 @@
                 </a:solidFill>
               </a:rPr>
               <a:pPr/>
-              <a:t>6/19/23</a:t>
+              <a:t>6/20/2023</a:t>
             </a:fld>
             <a:endParaRPr lang="en-US">
               <a:solidFill>
@@ -14711,10 +14694,10 @@
       </p:pic>
       <p:pic>
         <p:nvPicPr>
-          <p:cNvPr id="4" name="Picture 3" descr="A picture containing text, screenshot, square&#10;&#10;Description automatically generated">
+          <p:cNvPr id="5" name="Picture 4" descr="A picture containing text, screenshot, square&#10;&#10;Description automatically generated">
             <a:extLst>
               <a:ext uri="{FF2B5EF4-FFF2-40B4-BE49-F238E27FC236}">
-                <a16:creationId xmlns:a16="http://schemas.microsoft.com/office/drawing/2014/main" id="{E6822C04-2655-9AB3-C754-BBDAEF414E4D}"/>
+                <a16:creationId xmlns:a16="http://schemas.microsoft.com/office/drawing/2014/main" id="{95BEDF2A-A1F1-7609-8569-642329C69D7B}"/>
               </a:ext>
             </a:extLst>
           </p:cNvPr>
@@ -14737,8 +14720,8 @@
         </p:blipFill>
         <p:spPr>
           <a:xfrm>
-            <a:off x="965316" y="1534212"/>
-            <a:ext cx="5099995" cy="4325112"/>
+            <a:off x="1055328" y="1538748"/>
+            <a:ext cx="5102352" cy="4327111"/>
           </a:xfrm>
           <a:prstGeom prst="rect">
             <a:avLst/>
@@ -16132,13 +16115,8 @@
             </a:pPr>
             <a:r>
               <a:rPr lang="en-US" sz="7200" dirty="0"/>
-              <a:t>Aku </a:t>
-            </a:r>
-            <a:r>
-              <a:rPr lang="en-US" sz="7200" dirty="0" err="1"/>
-              <a:t>cina</a:t>
-            </a:r>
-            <a:endParaRPr lang="en-US" sz="7200" dirty="0"/>
+              <a:t>Aku CINA PELIT MISKIN</a:t>
+            </a:r>
           </a:p>
         </p:txBody>
       </p:sp>
@@ -24578,6 +24556,12 @@
 </file>
 
 <file path=customXml/item1.xml><?xml version="1.0" encoding="utf-8"?>
+<p:properties xmlns:p="http://schemas.microsoft.com/office/2006/metadata/properties" xmlns:xsi="http://www.w3.org/2001/XMLSchema-instance" xmlns:pc="http://schemas.microsoft.com/office/infopath/2007/PartnerControls">
+  <documentManagement/>
+</p:properties>
+</file>
+
+<file path=customXml/item2.xml><?xml version="1.0" encoding="utf-8"?>
 <ct:contentTypeSchema xmlns:ct="http://schemas.microsoft.com/office/2006/metadata/contentType" xmlns:ma="http://schemas.microsoft.com/office/2006/metadata/properties/metaAttributes" ct:_="" ma:_="" ma:contentTypeName="Dokumen" ma:contentTypeID="0x010100E578BFB713B0A04AA9CB3FB0E09BB096" ma:contentTypeVersion="8" ma:contentTypeDescription="Buat sebuah dokumen baru." ma:contentTypeScope="" ma:versionID="b12db5772b421c3d97e5e8cc52461df1">
   <xsd:schema xmlns:xsd="http://www.w3.org/2001/XMLSchema" xmlns:xs="http://www.w3.org/2001/XMLSchema" xmlns:p="http://schemas.microsoft.com/office/2006/metadata/properties" xmlns:ns3="d27b1e0a-a80f-43b3-a72c-03febd3edde5" targetNamespace="http://schemas.microsoft.com/office/2006/metadata/properties" ma:root="true" ma:fieldsID="93b8b61b0ccf34e75e41c3c949ba1e0b" ns3:_="">
     <xsd:import namespace="d27b1e0a-a80f-43b3-a72c-03febd3edde5"/>
@@ -24747,12 +24731,6 @@
 </ct:contentTypeSchema>
 </file>
 
-<file path=customXml/item2.xml><?xml version="1.0" encoding="utf-8"?>
-<p:properties xmlns:p="http://schemas.microsoft.com/office/2006/metadata/properties" xmlns:xsi="http://www.w3.org/2001/XMLSchema-instance" xmlns:pc="http://schemas.microsoft.com/office/infopath/2007/PartnerControls">
-  <documentManagement/>
-</p:properties>
-</file>
-
 <file path=customXml/item3.xml><?xml version="1.0" encoding="utf-8"?>
 <?mso-contentType ?>
 <FormTemplates xmlns="http://schemas.microsoft.com/sharepoint/v3/contenttype/forms">
@@ -24763,6 +24741,22 @@
 </file>
 
 <file path=customXml/itemProps1.xml><?xml version="1.0" encoding="utf-8"?>
+<ds:datastoreItem xmlns:ds="http://schemas.openxmlformats.org/officeDocument/2006/customXml" ds:itemID="{CD9CB790-CC05-41EE-8468-36831EC64B78}">
+  <ds:schemaRefs>
+    <ds:schemaRef ds:uri="http://schemas.openxmlformats.org/package/2006/metadata/core-properties"/>
+    <ds:schemaRef ds:uri="http://schemas.microsoft.com/office/2006/documentManagement/types"/>
+    <ds:schemaRef ds:uri="http://schemas.microsoft.com/office/infopath/2007/PartnerControls"/>
+    <ds:schemaRef ds:uri="d27b1e0a-a80f-43b3-a72c-03febd3edde5"/>
+    <ds:schemaRef ds:uri="http://schemas.microsoft.com/office/2006/metadata/properties"/>
+    <ds:schemaRef ds:uri="http://www.w3.org/XML/1998/namespace"/>
+    <ds:schemaRef ds:uri="http://purl.org/dc/dcmitype/"/>
+    <ds:schemaRef ds:uri="http://purl.org/dc/terms/"/>
+    <ds:schemaRef ds:uri="http://purl.org/dc/elements/1.1/"/>
+  </ds:schemaRefs>
+</ds:datastoreItem>
+</file>
+
+<file path=customXml/itemProps2.xml><?xml version="1.0" encoding="utf-8"?>
 <ds:datastoreItem xmlns:ds="http://schemas.openxmlformats.org/officeDocument/2006/customXml" ds:itemID="{74C6180C-AB73-4F26-8914-63FC793B0B03}">
   <ds:schemaRefs>
     <ds:schemaRef ds:uri="http://schemas.microsoft.com/office/2006/metadata/contentType"/>
@@ -24781,22 +24775,6 @@
 </ds:datastoreItem>
 </file>
 
-<file path=customXml/itemProps2.xml><?xml version="1.0" encoding="utf-8"?>
-<ds:datastoreItem xmlns:ds="http://schemas.openxmlformats.org/officeDocument/2006/customXml" ds:itemID="{CD9CB790-CC05-41EE-8468-36831EC64B78}">
-  <ds:schemaRefs>
-    <ds:schemaRef ds:uri="http://schemas.openxmlformats.org/package/2006/metadata/core-properties"/>
-    <ds:schemaRef ds:uri="http://schemas.microsoft.com/office/2006/documentManagement/types"/>
-    <ds:schemaRef ds:uri="http://schemas.microsoft.com/office/infopath/2007/PartnerControls"/>
-    <ds:schemaRef ds:uri="d27b1e0a-a80f-43b3-a72c-03febd3edde5"/>
-    <ds:schemaRef ds:uri="http://schemas.microsoft.com/office/2006/metadata/properties"/>
-    <ds:schemaRef ds:uri="http://www.w3.org/XML/1998/namespace"/>
-    <ds:schemaRef ds:uri="http://purl.org/dc/dcmitype/"/>
-    <ds:schemaRef ds:uri="http://purl.org/dc/terms/"/>
-    <ds:schemaRef ds:uri="http://purl.org/dc/elements/1.1/"/>
-  </ds:schemaRefs>
-</ds:datastoreItem>
-</file>
-
 <file path=customXml/itemProps3.xml><?xml version="1.0" encoding="utf-8"?>
 <ds:datastoreItem xmlns:ds="http://schemas.openxmlformats.org/officeDocument/2006/customXml" ds:itemID="{6F28412E-6216-429D-9368-A2DF44D347EE}">
   <ds:schemaRefs>

</xml_diff>

<commit_message>
feat: sidang TA revision
</commit_message>
<xml_diff>
--- a/Submit Sidang/05111942000001-Adam Satria Adidarma-Presentasi TA.pptx
+++ b/Submit Sidang/05111942000001-Adam Satria Adidarma-Presentasi TA.pptx
@@ -487,7 +487,7 @@
           <a:p>
             <a:fld id="{F2C69B06-AE52-4203-9155-65C4258A32D1}" type="datetimeFigureOut">
               <a:rPr lang="en-US" smtClean="0"/>
-              <a:t>6/21/23</a:t>
+              <a:t>6/22/23</a:t>
             </a:fld>
             <a:endParaRPr lang="en-US"/>
           </a:p>
@@ -3180,7 +3180,7 @@
           <a:p>
             <a:fld id="{82E1281C-38DA-4818-8C55-31099151AAF6}" type="datetimeFigureOut">
               <a:rPr lang="id-ID" smtClean="0"/>
-              <a:t>21/06/23</a:t>
+              <a:t>22/06/23</a:t>
             </a:fld>
             <a:endParaRPr lang="id-ID"/>
           </a:p>
@@ -3350,7 +3350,7 @@
           <a:p>
             <a:fld id="{82E1281C-38DA-4818-8C55-31099151AAF6}" type="datetimeFigureOut">
               <a:rPr lang="id-ID" smtClean="0"/>
-              <a:t>21/06/23</a:t>
+              <a:t>22/06/23</a:t>
             </a:fld>
             <a:endParaRPr lang="id-ID"/>
           </a:p>
@@ -3530,7 +3530,7 @@
           <a:p>
             <a:fld id="{82E1281C-38DA-4818-8C55-31099151AAF6}" type="datetimeFigureOut">
               <a:rPr lang="id-ID" smtClean="0"/>
-              <a:t>21/06/23</a:t>
+              <a:t>22/06/23</a:t>
             </a:fld>
             <a:endParaRPr lang="id-ID"/>
           </a:p>
@@ -4601,7 +4601,7 @@
                 </a:solidFill>
               </a:rPr>
               <a:pPr/>
-              <a:t>6/21/23</a:t>
+              <a:t>6/22/23</a:t>
             </a:fld>
             <a:endParaRPr lang="en-US">
               <a:solidFill>
@@ -4831,7 +4831,7 @@
                 </a:solidFill>
               </a:rPr>
               <a:pPr/>
-              <a:t>6/21/23</a:t>
+              <a:t>6/22/23</a:t>
             </a:fld>
             <a:endParaRPr lang="en-US">
               <a:solidFill>
@@ -5138,7 +5138,7 @@
                 </a:solidFill>
               </a:rPr>
               <a:pPr/>
-              <a:t>6/21/23</a:t>
+              <a:t>6/22/23</a:t>
             </a:fld>
             <a:endParaRPr lang="en-US">
               <a:solidFill>
@@ -5435,7 +5435,7 @@
                 </a:solidFill>
               </a:rPr>
               <a:pPr/>
-              <a:t>6/21/23</a:t>
+              <a:t>6/22/23</a:t>
             </a:fld>
             <a:endParaRPr lang="en-US">
               <a:solidFill>
@@ -5879,7 +5879,7 @@
                 </a:solidFill>
               </a:rPr>
               <a:pPr/>
-              <a:t>6/21/23</a:t>
+              <a:t>6/22/23</a:t>
             </a:fld>
             <a:endParaRPr lang="en-US">
               <a:solidFill>
@@ -6052,7 +6052,7 @@
                 </a:solidFill>
               </a:rPr>
               <a:pPr/>
-              <a:t>6/21/23</a:t>
+              <a:t>6/22/23</a:t>
             </a:fld>
             <a:endParaRPr lang="en-US">
               <a:solidFill>
@@ -6197,7 +6197,7 @@
                 </a:solidFill>
               </a:rPr>
               <a:pPr/>
-              <a:t>6/21/23</a:t>
+              <a:t>6/22/23</a:t>
             </a:fld>
             <a:endParaRPr lang="en-US">
               <a:solidFill>
@@ -6494,7 +6494,7 @@
           <a:p>
             <a:fld id="{82E1281C-38DA-4818-8C55-31099151AAF6}" type="datetimeFigureOut">
               <a:rPr lang="id-ID" smtClean="0"/>
-              <a:t>21/06/23</a:t>
+              <a:t>22/06/23</a:t>
             </a:fld>
             <a:endParaRPr lang="id-ID"/>
           </a:p>
@@ -6800,7 +6800,7 @@
                 </a:solidFill>
               </a:rPr>
               <a:pPr/>
-              <a:t>6/21/23</a:t>
+              <a:t>6/22/23</a:t>
             </a:fld>
             <a:endParaRPr lang="en-US">
               <a:solidFill>
@@ -7120,7 +7120,7 @@
                 </a:solidFill>
               </a:rPr>
               <a:pPr/>
-              <a:t>6/21/23</a:t>
+              <a:t>6/22/23</a:t>
             </a:fld>
             <a:endParaRPr lang="en-US">
               <a:solidFill>
@@ -7350,7 +7350,7 @@
                 </a:solidFill>
               </a:rPr>
               <a:pPr/>
-              <a:t>6/21/23</a:t>
+              <a:t>6/22/23</a:t>
             </a:fld>
             <a:endParaRPr lang="en-US">
               <a:solidFill>
@@ -7590,7 +7590,7 @@
                 </a:solidFill>
               </a:rPr>
               <a:pPr/>
-              <a:t>6/21/23</a:t>
+              <a:t>6/22/23</a:t>
             </a:fld>
             <a:endParaRPr lang="en-US">
               <a:solidFill>
@@ -7763,7 +7763,7 @@
                 </a:solidFill>
               </a:rPr>
               <a:pPr/>
-              <a:t>6/21/23</a:t>
+              <a:t>6/22/23</a:t>
             </a:fld>
             <a:endParaRPr lang="en-US">
               <a:solidFill>
@@ -8046,7 +8046,7 @@
           <a:p>
             <a:fld id="{82E1281C-38DA-4818-8C55-31099151AAF6}" type="datetimeFigureOut">
               <a:rPr lang="id-ID" smtClean="0"/>
-              <a:t>21/06/23</a:t>
+              <a:t>22/06/23</a:t>
             </a:fld>
             <a:endParaRPr lang="id-ID"/>
           </a:p>
@@ -8278,7 +8278,7 @@
           <a:p>
             <a:fld id="{82E1281C-38DA-4818-8C55-31099151AAF6}" type="datetimeFigureOut">
               <a:rPr lang="id-ID" smtClean="0"/>
-              <a:t>21/06/23</a:t>
+              <a:t>22/06/23</a:t>
             </a:fld>
             <a:endParaRPr lang="id-ID"/>
           </a:p>
@@ -8645,7 +8645,7 @@
           <a:p>
             <a:fld id="{82E1281C-38DA-4818-8C55-31099151AAF6}" type="datetimeFigureOut">
               <a:rPr lang="id-ID" smtClean="0"/>
-              <a:t>21/06/23</a:t>
+              <a:t>22/06/23</a:t>
             </a:fld>
             <a:endParaRPr lang="id-ID"/>
           </a:p>
@@ -8763,7 +8763,7 @@
           <a:p>
             <a:fld id="{82E1281C-38DA-4818-8C55-31099151AAF6}" type="datetimeFigureOut">
               <a:rPr lang="id-ID" smtClean="0"/>
-              <a:t>21/06/23</a:t>
+              <a:t>22/06/23</a:t>
             </a:fld>
             <a:endParaRPr lang="id-ID"/>
           </a:p>
@@ -8858,7 +8858,7 @@
           <a:p>
             <a:fld id="{82E1281C-38DA-4818-8C55-31099151AAF6}" type="datetimeFigureOut">
               <a:rPr lang="id-ID" smtClean="0"/>
-              <a:t>21/06/23</a:t>
+              <a:t>22/06/23</a:t>
             </a:fld>
             <a:endParaRPr lang="id-ID"/>
           </a:p>
@@ -9135,7 +9135,7 @@
           <a:p>
             <a:fld id="{82E1281C-38DA-4818-8C55-31099151AAF6}" type="datetimeFigureOut">
               <a:rPr lang="id-ID" smtClean="0"/>
-              <a:t>21/06/23</a:t>
+              <a:t>22/06/23</a:t>
             </a:fld>
             <a:endParaRPr lang="id-ID"/>
           </a:p>
@@ -9388,7 +9388,7 @@
           <a:p>
             <a:fld id="{82E1281C-38DA-4818-8C55-31099151AAF6}" type="datetimeFigureOut">
               <a:rPr lang="id-ID" smtClean="0"/>
-              <a:t>21/06/23</a:t>
+              <a:t>22/06/23</a:t>
             </a:fld>
             <a:endParaRPr lang="id-ID"/>
           </a:p>
@@ -9610,7 +9610,7 @@
           <a:p>
             <a:fld id="{82E1281C-38DA-4818-8C55-31099151AAF6}" type="datetimeFigureOut">
               <a:rPr lang="id-ID" smtClean="0"/>
-              <a:t>21/06/23</a:t>
+              <a:t>22/06/23</a:t>
             </a:fld>
             <a:endParaRPr lang="id-ID"/>
           </a:p>
@@ -10183,7 +10183,7 @@
                 </a:solidFill>
               </a:rPr>
               <a:pPr/>
-              <a:t>6/21/23</a:t>
+              <a:t>6/22/23</a:t>
             </a:fld>
             <a:endParaRPr lang="en-US">
               <a:solidFill>
@@ -16017,8 +16017,12 @@
           <a:p>
             <a:pPr algn="l"/>
             <a:r>
+              <a:rPr lang="en-US" sz="2400" b="0" i="0" u="none" strike="noStrike" baseline="0"/>
+              <a:t>AI has grown </a:t>
+            </a:r>
+            <a:r>
               <a:rPr lang="en-US" sz="2400" b="0" i="0" u="none" strike="noStrike" baseline="0" dirty="0"/>
-              <a:t>AI has has grown by 37% on various industries and sectors of society around the world, with the adoption of AI growing from 2018 – 2019</a:t>
+              <a:t>by 37% on various industries and sectors of society around the world, with the adoption of AI growing from 2018 – 2019</a:t>
             </a:r>
             <a:endParaRPr lang="en-US" sz="2400" dirty="0"/>
           </a:p>
@@ -24207,6 +24211,12 @@
 </file>
 
 <file path=customXml/item1.xml><?xml version="1.0" encoding="utf-8"?>
+<p:properties xmlns:p="http://schemas.microsoft.com/office/2006/metadata/properties" xmlns:xsi="http://www.w3.org/2001/XMLSchema-instance" xmlns:pc="http://schemas.microsoft.com/office/infopath/2007/PartnerControls">
+  <documentManagement/>
+</p:properties>
+</file>
+
+<file path=customXml/item2.xml><?xml version="1.0" encoding="utf-8"?>
 <ct:contentTypeSchema xmlns:ct="http://schemas.microsoft.com/office/2006/metadata/contentType" xmlns:ma="http://schemas.microsoft.com/office/2006/metadata/properties/metaAttributes" ct:_="" ma:_="" ma:contentTypeName="Dokumen" ma:contentTypeID="0x010100E578BFB713B0A04AA9CB3FB0E09BB096" ma:contentTypeVersion="8" ma:contentTypeDescription="Buat sebuah dokumen baru." ma:contentTypeScope="" ma:versionID="b12db5772b421c3d97e5e8cc52461df1">
   <xsd:schema xmlns:xsd="http://www.w3.org/2001/XMLSchema" xmlns:xs="http://www.w3.org/2001/XMLSchema" xmlns:p="http://schemas.microsoft.com/office/2006/metadata/properties" xmlns:ns3="d27b1e0a-a80f-43b3-a72c-03febd3edde5" targetNamespace="http://schemas.microsoft.com/office/2006/metadata/properties" ma:root="true" ma:fieldsID="93b8b61b0ccf34e75e41c3c949ba1e0b" ns3:_="">
     <xsd:import namespace="d27b1e0a-a80f-43b3-a72c-03febd3edde5"/>
@@ -24376,12 +24386,6 @@
 </ct:contentTypeSchema>
 </file>
 
-<file path=customXml/item2.xml><?xml version="1.0" encoding="utf-8"?>
-<p:properties xmlns:p="http://schemas.microsoft.com/office/2006/metadata/properties" xmlns:xsi="http://www.w3.org/2001/XMLSchema-instance" xmlns:pc="http://schemas.microsoft.com/office/infopath/2007/PartnerControls">
-  <documentManagement/>
-</p:properties>
-</file>
-
 <file path=customXml/item3.xml><?xml version="1.0" encoding="utf-8"?>
 <?mso-contentType ?>
 <FormTemplates xmlns="http://schemas.microsoft.com/sharepoint/v3/contenttype/forms">
@@ -24392,6 +24396,22 @@
 </file>
 
 <file path=customXml/itemProps1.xml><?xml version="1.0" encoding="utf-8"?>
+<ds:datastoreItem xmlns:ds="http://schemas.openxmlformats.org/officeDocument/2006/customXml" ds:itemID="{CD9CB790-CC05-41EE-8468-36831EC64B78}">
+  <ds:schemaRefs>
+    <ds:schemaRef ds:uri="http://schemas.openxmlformats.org/package/2006/metadata/core-properties"/>
+    <ds:schemaRef ds:uri="http://schemas.microsoft.com/office/2006/documentManagement/types"/>
+    <ds:schemaRef ds:uri="http://schemas.microsoft.com/office/infopath/2007/PartnerControls"/>
+    <ds:schemaRef ds:uri="d27b1e0a-a80f-43b3-a72c-03febd3edde5"/>
+    <ds:schemaRef ds:uri="http://schemas.microsoft.com/office/2006/metadata/properties"/>
+    <ds:schemaRef ds:uri="http://www.w3.org/XML/1998/namespace"/>
+    <ds:schemaRef ds:uri="http://purl.org/dc/dcmitype/"/>
+    <ds:schemaRef ds:uri="http://purl.org/dc/terms/"/>
+    <ds:schemaRef ds:uri="http://purl.org/dc/elements/1.1/"/>
+  </ds:schemaRefs>
+</ds:datastoreItem>
+</file>
+
+<file path=customXml/itemProps2.xml><?xml version="1.0" encoding="utf-8"?>
 <ds:datastoreItem xmlns:ds="http://schemas.openxmlformats.org/officeDocument/2006/customXml" ds:itemID="{74C6180C-AB73-4F26-8914-63FC793B0B03}">
   <ds:schemaRefs>
     <ds:schemaRef ds:uri="http://schemas.microsoft.com/office/2006/metadata/contentType"/>
@@ -24410,22 +24430,6 @@
 </ds:datastoreItem>
 </file>
 
-<file path=customXml/itemProps2.xml><?xml version="1.0" encoding="utf-8"?>
-<ds:datastoreItem xmlns:ds="http://schemas.openxmlformats.org/officeDocument/2006/customXml" ds:itemID="{CD9CB790-CC05-41EE-8468-36831EC64B78}">
-  <ds:schemaRefs>
-    <ds:schemaRef ds:uri="http://schemas.openxmlformats.org/package/2006/metadata/core-properties"/>
-    <ds:schemaRef ds:uri="http://schemas.microsoft.com/office/2006/documentManagement/types"/>
-    <ds:schemaRef ds:uri="http://schemas.microsoft.com/office/infopath/2007/PartnerControls"/>
-    <ds:schemaRef ds:uri="d27b1e0a-a80f-43b3-a72c-03febd3edde5"/>
-    <ds:schemaRef ds:uri="http://schemas.microsoft.com/office/2006/metadata/properties"/>
-    <ds:schemaRef ds:uri="http://www.w3.org/XML/1998/namespace"/>
-    <ds:schemaRef ds:uri="http://purl.org/dc/dcmitype/"/>
-    <ds:schemaRef ds:uri="http://purl.org/dc/terms/"/>
-    <ds:schemaRef ds:uri="http://purl.org/dc/elements/1.1/"/>
-  </ds:schemaRefs>
-</ds:datastoreItem>
-</file>
-
 <file path=customXml/itemProps3.xml><?xml version="1.0" encoding="utf-8"?>
 <ds:datastoreItem xmlns:ds="http://schemas.openxmlformats.org/officeDocument/2006/customXml" ds:itemID="{6F28412E-6216-429D-9368-A2DF44D347EE}">
   <ds:schemaRefs>

</xml_diff>